<commit_message>
slight changes project doc and updated it
</commit_message>
<xml_diff>
--- a/source/MySEProject/Documentation/ML2324-8 Implement Anomaly Detection Sample.pptx
+++ b/source/MySEProject/Documentation/ML2324-8 Implement Anomaly Detection Sample.pptx
@@ -5,7 +5,7 @@
     <p:sldMasterId id="2147483725" r:id="rId1"/>
   </p:sldMasterIdLst>
   <p:notesMasterIdLst>
-    <p:notesMasterId r:id="rId14"/>
+    <p:notesMasterId r:id="rId22"/>
   </p:notesMasterIdLst>
   <p:sldIdLst>
     <p:sldId id="256" r:id="rId2"/>
@@ -16,10 +16,18 @@
     <p:sldId id="274" r:id="rId7"/>
     <p:sldId id="273" r:id="rId8"/>
     <p:sldId id="275" r:id="rId9"/>
-    <p:sldId id="276" r:id="rId10"/>
-    <p:sldId id="266" r:id="rId11"/>
-    <p:sldId id="267" r:id="rId12"/>
-    <p:sldId id="268" r:id="rId13"/>
+    <p:sldId id="277" r:id="rId10"/>
+    <p:sldId id="278" r:id="rId11"/>
+    <p:sldId id="279" r:id="rId12"/>
+    <p:sldId id="280" r:id="rId13"/>
+    <p:sldId id="281" r:id="rId14"/>
+    <p:sldId id="282" r:id="rId15"/>
+    <p:sldId id="283" r:id="rId16"/>
+    <p:sldId id="284" r:id="rId17"/>
+    <p:sldId id="276" r:id="rId18"/>
+    <p:sldId id="266" r:id="rId19"/>
+    <p:sldId id="267" r:id="rId20"/>
+    <p:sldId id="268" r:id="rId21"/>
   </p:sldIdLst>
   <p:sldSz cx="12192000" cy="6858000"/>
   <p:notesSz cx="6858000" cy="9144000"/>
@@ -10927,7 +10935,7 @@
                 <a:latin typeface="Arial" panose="020B0604020202020204" pitchFamily="34" charset="0"/>
                 <a:cs typeface="Arial" panose="020B0604020202020204" pitchFamily="34" charset="0"/>
               </a:rPr>
-              <a:t>Implement Anomaly Detection Sample</a:t>
+              <a:t>Project Title: Implement Anomaly Detection Sample</a:t>
             </a:r>
           </a:p>
         </p:txBody>
@@ -11626,6 +11634,1685 @@
 <file path=ppt/slides/slide10.xml><?xml version="1.0" encoding="utf-8"?>
 <p:sld xmlns:a="http://schemas.openxmlformats.org/drawingml/2006/main" xmlns:r="http://schemas.openxmlformats.org/officeDocument/2006/relationships" xmlns:p="http://schemas.openxmlformats.org/presentationml/2006/main">
   <p:cSld>
+    <p:spTree>
+      <p:nvGrpSpPr>
+        <p:cNvPr id="1" name=""/>
+        <p:cNvGrpSpPr/>
+        <p:nvPr/>
+      </p:nvGrpSpPr>
+      <p:grpSpPr>
+        <a:xfrm>
+          <a:off x="0" y="0"/>
+          <a:ext cx="0" cy="0"/>
+          <a:chOff x="0" y="0"/>
+          <a:chExt cx="0" cy="0"/>
+        </a:xfrm>
+      </p:grpSpPr>
+      <p:sp>
+        <p:nvSpPr>
+          <p:cNvPr id="2" name="Title 1">
+            <a:extLst>
+              <a:ext uri="{FF2B5EF4-FFF2-40B4-BE49-F238E27FC236}">
+                <a16:creationId xmlns:a16="http://schemas.microsoft.com/office/drawing/2014/main" id="{0A9AAD05-9A8B-C30B-B4D9-99E3A92A99B5}"/>
+              </a:ext>
+            </a:extLst>
+          </p:cNvPr>
+          <p:cNvSpPr>
+            <a:spLocks noGrp="1"/>
+          </p:cNvSpPr>
+          <p:nvPr>
+            <p:ph type="title"/>
+          </p:nvPr>
+        </p:nvSpPr>
+        <p:spPr>
+          <a:xfrm>
+            <a:off x="674976" y="702156"/>
+            <a:ext cx="10935832" cy="630482"/>
+          </a:xfrm>
+        </p:spPr>
+        <p:txBody>
+          <a:bodyPr/>
+          <a:lstStyle/>
+          <a:p>
+            <a:r>
+              <a:rPr lang="en-US" dirty="0"/>
+              <a:t>Execution of Project (Cont.)</a:t>
+            </a:r>
+          </a:p>
+        </p:txBody>
+      </p:sp>
+      <p:sp>
+        <p:nvSpPr>
+          <p:cNvPr id="5" name="Slide Number Placeholder 4">
+            <a:extLst>
+              <a:ext uri="{FF2B5EF4-FFF2-40B4-BE49-F238E27FC236}">
+                <a16:creationId xmlns:a16="http://schemas.microsoft.com/office/drawing/2014/main" id="{57203070-D601-457B-9DF7-A4611183F29A}"/>
+              </a:ext>
+            </a:extLst>
+          </p:cNvPr>
+          <p:cNvSpPr>
+            <a:spLocks noGrp="1"/>
+          </p:cNvSpPr>
+          <p:nvPr>
+            <p:ph type="sldNum" sz="quarter" idx="12"/>
+          </p:nvPr>
+        </p:nvSpPr>
+        <p:spPr/>
+        <p:txBody>
+          <a:bodyPr/>
+          <a:lstStyle/>
+          <a:p>
+            <a:fld id="{3A98EE3D-8CD1-4C3F-BD1C-C98C9596463C}" type="slidenum">
+              <a:rPr lang="en-US" smtClean="0"/>
+              <a:t>10</a:t>
+            </a:fld>
+            <a:endParaRPr lang="en-US" dirty="0"/>
+          </a:p>
+        </p:txBody>
+      </p:sp>
+      <p:sp>
+        <p:nvSpPr>
+          <p:cNvPr id="10" name="TextBox 9">
+            <a:extLst>
+              <a:ext uri="{FF2B5EF4-FFF2-40B4-BE49-F238E27FC236}">
+                <a16:creationId xmlns:a16="http://schemas.microsoft.com/office/drawing/2014/main" id="{3710AD9B-9F24-E8D6-B646-8CCC5F54AE35}"/>
+              </a:ext>
+            </a:extLst>
+          </p:cNvPr>
+          <p:cNvSpPr txBox="1"/>
+          <p:nvPr/>
+        </p:nvSpPr>
+        <p:spPr>
+          <a:xfrm>
+            <a:off x="674976" y="1863969"/>
+            <a:ext cx="9883324" cy="1200329"/>
+          </a:xfrm>
+          <a:prstGeom prst="rect">
+            <a:avLst/>
+          </a:prstGeom>
+          <a:noFill/>
+        </p:spPr>
+        <p:txBody>
+          <a:bodyPr wrap="square">
+            <a:spAutoFit/>
+          </a:bodyPr>
+          <a:lstStyle/>
+          <a:p>
+            <a:r>
+              <a:rPr lang="en-US" b="0" i="0" dirty="0">
+                <a:solidFill>
+                  <a:srgbClr val="1F2328"/>
+                </a:solidFill>
+                <a:effectLst/>
+                <a:latin typeface="-apple-system"/>
+              </a:rPr>
+              <a:t>In the beginning, we have the Extract Sequences From Folder method of </a:t>
+            </a:r>
+            <a:r>
+              <a:rPr lang="en-US" b="0" i="0" u="sng" dirty="0" err="1">
+                <a:effectLst/>
+                <a:latin typeface="-apple-system"/>
+                <a:hlinkClick r:id="rId2"/>
+              </a:rPr>
+              <a:t>CsvSequenceFolder</a:t>
+            </a:r>
+            <a:r>
+              <a:rPr lang="en-US" b="0" i="0" dirty="0">
+                <a:solidFill>
+                  <a:srgbClr val="1F2328"/>
+                </a:solidFill>
+                <a:effectLst/>
+                <a:latin typeface="-apple-system"/>
+              </a:rPr>
+              <a:t> class to read all the files placed inside a folder.</a:t>
+            </a:r>
+          </a:p>
+          <a:p>
+            <a:endParaRPr lang="en-US" dirty="0">
+              <a:solidFill>
+                <a:srgbClr val="1F2328"/>
+              </a:solidFill>
+              <a:latin typeface="-apple-system"/>
+            </a:endParaRPr>
+          </a:p>
+          <a:p>
+            <a:endParaRPr lang="en-US" dirty="0"/>
+          </a:p>
+        </p:txBody>
+      </p:sp>
+      <p:pic>
+        <p:nvPicPr>
+          <p:cNvPr id="12" name="Picture 11">
+            <a:extLst>
+              <a:ext uri="{FF2B5EF4-FFF2-40B4-BE49-F238E27FC236}">
+                <a16:creationId xmlns:a16="http://schemas.microsoft.com/office/drawing/2014/main" id="{EA568224-3995-93C6-193C-431FC17FA572}"/>
+              </a:ext>
+            </a:extLst>
+          </p:cNvPr>
+          <p:cNvPicPr>
+            <a:picLocks noChangeAspect="1"/>
+          </p:cNvPicPr>
+          <p:nvPr/>
+        </p:nvPicPr>
+        <p:blipFill>
+          <a:blip r:embed="rId3"/>
+          <a:stretch>
+            <a:fillRect/>
+          </a:stretch>
+        </p:blipFill>
+        <p:spPr>
+          <a:xfrm>
+            <a:off x="1167345" y="2927874"/>
+            <a:ext cx="7097115" cy="2200582"/>
+          </a:xfrm>
+          <a:prstGeom prst="rect">
+            <a:avLst/>
+          </a:prstGeom>
+        </p:spPr>
+      </p:pic>
+    </p:spTree>
+    <p:extLst>
+      <p:ext uri="{BB962C8B-B14F-4D97-AF65-F5344CB8AC3E}">
+        <p14:creationId xmlns:p14="http://schemas.microsoft.com/office/powerpoint/2010/main" val="260451045"/>
+      </p:ext>
+    </p:extLst>
+  </p:cSld>
+  <p:clrMapOvr>
+    <a:masterClrMapping/>
+  </p:clrMapOvr>
+</p:sld>
+</file>
+
+<file path=ppt/slides/slide11.xml><?xml version="1.0" encoding="utf-8"?>
+<p:sld xmlns:a="http://schemas.openxmlformats.org/drawingml/2006/main" xmlns:r="http://schemas.openxmlformats.org/officeDocument/2006/relationships" xmlns:p="http://schemas.openxmlformats.org/presentationml/2006/main">
+  <p:cSld>
+    <p:spTree>
+      <p:nvGrpSpPr>
+        <p:cNvPr id="1" name=""/>
+        <p:cNvGrpSpPr/>
+        <p:nvPr/>
+      </p:nvGrpSpPr>
+      <p:grpSpPr>
+        <a:xfrm>
+          <a:off x="0" y="0"/>
+          <a:ext cx="0" cy="0"/>
+          <a:chOff x="0" y="0"/>
+          <a:chExt cx="0" cy="0"/>
+        </a:xfrm>
+      </p:grpSpPr>
+      <p:sp>
+        <p:nvSpPr>
+          <p:cNvPr id="2" name="Title 1">
+            <a:extLst>
+              <a:ext uri="{FF2B5EF4-FFF2-40B4-BE49-F238E27FC236}">
+                <a16:creationId xmlns:a16="http://schemas.microsoft.com/office/drawing/2014/main" id="{0A9AAD05-9A8B-C30B-B4D9-99E3A92A99B5}"/>
+              </a:ext>
+            </a:extLst>
+          </p:cNvPr>
+          <p:cNvSpPr>
+            <a:spLocks noGrp="1"/>
+          </p:cNvSpPr>
+          <p:nvPr>
+            <p:ph type="title"/>
+          </p:nvPr>
+        </p:nvSpPr>
+        <p:spPr>
+          <a:xfrm>
+            <a:off x="674976" y="702156"/>
+            <a:ext cx="10935832" cy="630482"/>
+          </a:xfrm>
+        </p:spPr>
+        <p:txBody>
+          <a:bodyPr/>
+          <a:lstStyle/>
+          <a:p>
+            <a:r>
+              <a:rPr lang="en-US" dirty="0"/>
+              <a:t>Execution of Project (Cont.)</a:t>
+            </a:r>
+          </a:p>
+        </p:txBody>
+      </p:sp>
+      <p:sp>
+        <p:nvSpPr>
+          <p:cNvPr id="5" name="Slide Number Placeholder 4">
+            <a:extLst>
+              <a:ext uri="{FF2B5EF4-FFF2-40B4-BE49-F238E27FC236}">
+                <a16:creationId xmlns:a16="http://schemas.microsoft.com/office/drawing/2014/main" id="{57203070-D601-457B-9DF7-A4611183F29A}"/>
+              </a:ext>
+            </a:extLst>
+          </p:cNvPr>
+          <p:cNvSpPr>
+            <a:spLocks noGrp="1"/>
+          </p:cNvSpPr>
+          <p:nvPr>
+            <p:ph type="sldNum" sz="quarter" idx="12"/>
+          </p:nvPr>
+        </p:nvSpPr>
+        <p:spPr/>
+        <p:txBody>
+          <a:bodyPr/>
+          <a:lstStyle/>
+          <a:p>
+            <a:fld id="{3A98EE3D-8CD1-4C3F-BD1C-C98C9596463C}" type="slidenum">
+              <a:rPr lang="en-US" smtClean="0"/>
+              <a:t>11</a:t>
+            </a:fld>
+            <a:endParaRPr lang="en-US" dirty="0"/>
+          </a:p>
+        </p:txBody>
+      </p:sp>
+      <p:sp>
+        <p:nvSpPr>
+          <p:cNvPr id="10" name="TextBox 9">
+            <a:extLst>
+              <a:ext uri="{FF2B5EF4-FFF2-40B4-BE49-F238E27FC236}">
+                <a16:creationId xmlns:a16="http://schemas.microsoft.com/office/drawing/2014/main" id="{3710AD9B-9F24-E8D6-B646-8CCC5F54AE35}"/>
+              </a:ext>
+            </a:extLst>
+          </p:cNvPr>
+          <p:cNvSpPr txBox="1"/>
+          <p:nvPr/>
+        </p:nvSpPr>
+        <p:spPr>
+          <a:xfrm>
+            <a:off x="674976" y="1863969"/>
+            <a:ext cx="9883324" cy="1200329"/>
+          </a:xfrm>
+          <a:prstGeom prst="rect">
+            <a:avLst/>
+          </a:prstGeom>
+          <a:noFill/>
+        </p:spPr>
+        <p:txBody>
+          <a:bodyPr wrap="square">
+            <a:spAutoFit/>
+          </a:bodyPr>
+          <a:lstStyle/>
+          <a:p>
+            <a:pPr algn="l"/>
+            <a:r>
+              <a:rPr lang="en-US" b="0" i="0" dirty="0">
+                <a:solidFill>
+                  <a:srgbClr val="1F2328"/>
+                </a:solidFill>
+                <a:effectLst/>
+                <a:latin typeface="-apple-system"/>
+              </a:rPr>
+              <a:t>After that, the method </a:t>
+            </a:r>
+            <a:r>
+              <a:rPr lang="en-US" b="0" i="0" dirty="0" err="1">
+                <a:solidFill>
+                  <a:srgbClr val="1F2328"/>
+                </a:solidFill>
+                <a:effectLst/>
+                <a:latin typeface="-apple-system"/>
+              </a:rPr>
+              <a:t>ConvertToHTMInput</a:t>
+            </a:r>
+            <a:r>
+              <a:rPr lang="en-US" b="0" i="0" dirty="0">
+                <a:solidFill>
+                  <a:srgbClr val="1F2328"/>
+                </a:solidFill>
+                <a:effectLst/>
+                <a:latin typeface="-apple-system"/>
+              </a:rPr>
+              <a:t> of </a:t>
+            </a:r>
+            <a:r>
+              <a:rPr lang="en-US" b="0" i="0" u="sng" dirty="0" err="1">
+                <a:solidFill>
+                  <a:srgbClr val="1F2328"/>
+                </a:solidFill>
+                <a:effectLst/>
+                <a:latin typeface="-apple-system"/>
+                <a:hlinkClick r:id="rId2"/>
+              </a:rPr>
+              <a:t>CSVToHTMInputConverter</a:t>
+            </a:r>
+            <a:r>
+              <a:rPr lang="en-US" b="0" i="0" dirty="0">
+                <a:solidFill>
+                  <a:srgbClr val="1F2328"/>
+                </a:solidFill>
+                <a:effectLst/>
+                <a:latin typeface="-apple-system"/>
+              </a:rPr>
+              <a:t> class is there which converts all the read sequences to a format suitable for HTM training.</a:t>
+            </a:r>
+          </a:p>
+          <a:p>
+            <a:endParaRPr lang="en-US" dirty="0">
+              <a:solidFill>
+                <a:srgbClr val="1F2328"/>
+              </a:solidFill>
+              <a:latin typeface="-apple-system"/>
+            </a:endParaRPr>
+          </a:p>
+          <a:p>
+            <a:endParaRPr lang="en-US" dirty="0"/>
+          </a:p>
+        </p:txBody>
+      </p:sp>
+      <p:pic>
+        <p:nvPicPr>
+          <p:cNvPr id="4" name="Picture 3">
+            <a:extLst>
+              <a:ext uri="{FF2B5EF4-FFF2-40B4-BE49-F238E27FC236}">
+                <a16:creationId xmlns:a16="http://schemas.microsoft.com/office/drawing/2014/main" id="{82A53E7F-D8AA-A16A-A5DE-F74F286522C3}"/>
+              </a:ext>
+            </a:extLst>
+          </p:cNvPr>
+          <p:cNvPicPr>
+            <a:picLocks noChangeAspect="1"/>
+          </p:cNvPicPr>
+          <p:nvPr/>
+        </p:nvPicPr>
+        <p:blipFill>
+          <a:blip r:embed="rId3"/>
+          <a:stretch>
+            <a:fillRect/>
+          </a:stretch>
+        </p:blipFill>
+        <p:spPr>
+          <a:xfrm>
+            <a:off x="674976" y="2925643"/>
+            <a:ext cx="7344800" cy="1905266"/>
+          </a:xfrm>
+          <a:prstGeom prst="rect">
+            <a:avLst/>
+          </a:prstGeom>
+        </p:spPr>
+      </p:pic>
+    </p:spTree>
+    <p:extLst>
+      <p:ext uri="{BB962C8B-B14F-4D97-AF65-F5344CB8AC3E}">
+        <p14:creationId xmlns:p14="http://schemas.microsoft.com/office/powerpoint/2010/main" val="2009533949"/>
+      </p:ext>
+    </p:extLst>
+  </p:cSld>
+  <p:clrMapOvr>
+    <a:masterClrMapping/>
+  </p:clrMapOvr>
+</p:sld>
+</file>
+
+<file path=ppt/slides/slide12.xml><?xml version="1.0" encoding="utf-8"?>
+<p:sld xmlns:a="http://schemas.openxmlformats.org/drawingml/2006/main" xmlns:r="http://schemas.openxmlformats.org/officeDocument/2006/relationships" xmlns:p="http://schemas.openxmlformats.org/presentationml/2006/main">
+  <p:cSld>
+    <p:spTree>
+      <p:nvGrpSpPr>
+        <p:cNvPr id="1" name=""/>
+        <p:cNvGrpSpPr/>
+        <p:nvPr/>
+      </p:nvGrpSpPr>
+      <p:grpSpPr>
+        <a:xfrm>
+          <a:off x="0" y="0"/>
+          <a:ext cx="0" cy="0"/>
+          <a:chOff x="0" y="0"/>
+          <a:chExt cx="0" cy="0"/>
+        </a:xfrm>
+      </p:grpSpPr>
+      <p:sp>
+        <p:nvSpPr>
+          <p:cNvPr id="2" name="Title 1">
+            <a:extLst>
+              <a:ext uri="{FF2B5EF4-FFF2-40B4-BE49-F238E27FC236}">
+                <a16:creationId xmlns:a16="http://schemas.microsoft.com/office/drawing/2014/main" id="{0A9AAD05-9A8B-C30B-B4D9-99E3A92A99B5}"/>
+              </a:ext>
+            </a:extLst>
+          </p:cNvPr>
+          <p:cNvSpPr>
+            <a:spLocks noGrp="1"/>
+          </p:cNvSpPr>
+          <p:nvPr>
+            <p:ph type="title"/>
+          </p:nvPr>
+        </p:nvSpPr>
+        <p:spPr>
+          <a:xfrm>
+            <a:off x="674976" y="702156"/>
+            <a:ext cx="10935832" cy="630482"/>
+          </a:xfrm>
+        </p:spPr>
+        <p:txBody>
+          <a:bodyPr/>
+          <a:lstStyle/>
+          <a:p>
+            <a:r>
+              <a:rPr lang="en-US" dirty="0"/>
+              <a:t>Execution of Project (Cont.)</a:t>
+            </a:r>
+          </a:p>
+        </p:txBody>
+      </p:sp>
+      <p:sp>
+        <p:nvSpPr>
+          <p:cNvPr id="5" name="Slide Number Placeholder 4">
+            <a:extLst>
+              <a:ext uri="{FF2B5EF4-FFF2-40B4-BE49-F238E27FC236}">
+                <a16:creationId xmlns:a16="http://schemas.microsoft.com/office/drawing/2014/main" id="{57203070-D601-457B-9DF7-A4611183F29A}"/>
+              </a:ext>
+            </a:extLst>
+          </p:cNvPr>
+          <p:cNvSpPr>
+            <a:spLocks noGrp="1"/>
+          </p:cNvSpPr>
+          <p:nvPr>
+            <p:ph type="sldNum" sz="quarter" idx="12"/>
+          </p:nvPr>
+        </p:nvSpPr>
+        <p:spPr/>
+        <p:txBody>
+          <a:bodyPr/>
+          <a:lstStyle/>
+          <a:p>
+            <a:fld id="{3A98EE3D-8CD1-4C3F-BD1C-C98C9596463C}" type="slidenum">
+              <a:rPr lang="en-US" smtClean="0"/>
+              <a:t>12</a:t>
+            </a:fld>
+            <a:endParaRPr lang="en-US" dirty="0"/>
+          </a:p>
+        </p:txBody>
+      </p:sp>
+      <p:sp>
+        <p:nvSpPr>
+          <p:cNvPr id="10" name="TextBox 9">
+            <a:extLst>
+              <a:ext uri="{FF2B5EF4-FFF2-40B4-BE49-F238E27FC236}">
+                <a16:creationId xmlns:a16="http://schemas.microsoft.com/office/drawing/2014/main" id="{3710AD9B-9F24-E8D6-B646-8CCC5F54AE35}"/>
+              </a:ext>
+            </a:extLst>
+          </p:cNvPr>
+          <p:cNvSpPr txBox="1"/>
+          <p:nvPr/>
+        </p:nvSpPr>
+        <p:spPr>
+          <a:xfrm>
+            <a:off x="792206" y="1875692"/>
+            <a:ext cx="9883324" cy="923330"/>
+          </a:xfrm>
+          <a:prstGeom prst="rect">
+            <a:avLst/>
+          </a:prstGeom>
+          <a:noFill/>
+        </p:spPr>
+        <p:txBody>
+          <a:bodyPr wrap="square">
+            <a:spAutoFit/>
+          </a:bodyPr>
+          <a:lstStyle/>
+          <a:p>
+            <a:pPr algn="l"/>
+            <a:r>
+              <a:rPr lang="en-US" b="0" i="0" dirty="0">
+                <a:solidFill>
+                  <a:srgbClr val="1F2328"/>
+                </a:solidFill>
+                <a:effectLst/>
+                <a:latin typeface="-apple-system"/>
+              </a:rPr>
+              <a:t>After that, we have </a:t>
+            </a:r>
+            <a:r>
+              <a:rPr lang="en-US" b="0" i="0" dirty="0" err="1">
+                <a:solidFill>
+                  <a:srgbClr val="1F2328"/>
+                </a:solidFill>
+                <a:effectLst/>
+                <a:latin typeface="-apple-system"/>
+              </a:rPr>
+              <a:t>ExecuteHTMModelTraining</a:t>
+            </a:r>
+            <a:r>
+              <a:rPr lang="en-US" b="0" i="0" dirty="0">
+                <a:solidFill>
+                  <a:srgbClr val="1F2328"/>
+                </a:solidFill>
+                <a:effectLst/>
+                <a:latin typeface="-apple-system"/>
+              </a:rPr>
+              <a:t> method of </a:t>
+            </a:r>
+            <a:r>
+              <a:rPr lang="en-US" b="0" i="0" u="sng" dirty="0" err="1">
+                <a:effectLst/>
+                <a:latin typeface="-apple-system"/>
+                <a:hlinkClick r:id="rId2"/>
+              </a:rPr>
+              <a:t>HTMTrainingManager</a:t>
+            </a:r>
+            <a:r>
+              <a:rPr lang="en-US" b="0" i="0" dirty="0">
+                <a:solidFill>
+                  <a:srgbClr val="1F2328"/>
+                </a:solidFill>
+                <a:effectLst/>
+                <a:latin typeface="-apple-system"/>
+              </a:rPr>
+              <a:t> class to train our model using the converted sequences.</a:t>
+            </a:r>
+            <a:endParaRPr lang="en-US" dirty="0">
+              <a:solidFill>
+                <a:srgbClr val="1F2328"/>
+              </a:solidFill>
+              <a:latin typeface="-apple-system"/>
+            </a:endParaRPr>
+          </a:p>
+          <a:p>
+            <a:endParaRPr lang="en-US" dirty="0"/>
+          </a:p>
+        </p:txBody>
+      </p:sp>
+      <p:pic>
+        <p:nvPicPr>
+          <p:cNvPr id="6" name="Picture 5">
+            <a:extLst>
+              <a:ext uri="{FF2B5EF4-FFF2-40B4-BE49-F238E27FC236}">
+                <a16:creationId xmlns:a16="http://schemas.microsoft.com/office/drawing/2014/main" id="{8B66DA3A-FA51-4603-248A-989A1F71B8D5}"/>
+              </a:ext>
+            </a:extLst>
+          </p:cNvPr>
+          <p:cNvPicPr>
+            <a:picLocks noChangeAspect="1"/>
+          </p:cNvPicPr>
+          <p:nvPr/>
+        </p:nvPicPr>
+        <p:blipFill>
+          <a:blip r:embed="rId3"/>
+          <a:stretch>
+            <a:fillRect/>
+          </a:stretch>
+        </p:blipFill>
+        <p:spPr>
+          <a:xfrm>
+            <a:off x="792206" y="2819675"/>
+            <a:ext cx="7192379" cy="1986787"/>
+          </a:xfrm>
+          <a:prstGeom prst="rect">
+            <a:avLst/>
+          </a:prstGeom>
+        </p:spPr>
+      </p:pic>
+    </p:spTree>
+    <p:extLst>
+      <p:ext uri="{BB962C8B-B14F-4D97-AF65-F5344CB8AC3E}">
+        <p14:creationId xmlns:p14="http://schemas.microsoft.com/office/powerpoint/2010/main" val="377889875"/>
+      </p:ext>
+    </p:extLst>
+  </p:cSld>
+  <p:clrMapOvr>
+    <a:masterClrMapping/>
+  </p:clrMapOvr>
+</p:sld>
+</file>
+
+<file path=ppt/slides/slide13.xml><?xml version="1.0" encoding="utf-8"?>
+<p:sld xmlns:a="http://schemas.openxmlformats.org/drawingml/2006/main" xmlns:r="http://schemas.openxmlformats.org/officeDocument/2006/relationships" xmlns:p="http://schemas.openxmlformats.org/presentationml/2006/main">
+  <p:cSld>
+    <p:spTree>
+      <p:nvGrpSpPr>
+        <p:cNvPr id="1" name=""/>
+        <p:cNvGrpSpPr/>
+        <p:nvPr/>
+      </p:nvGrpSpPr>
+      <p:grpSpPr>
+        <a:xfrm>
+          <a:off x="0" y="0"/>
+          <a:ext cx="0" cy="0"/>
+          <a:chOff x="0" y="0"/>
+          <a:chExt cx="0" cy="0"/>
+        </a:xfrm>
+      </p:grpSpPr>
+      <p:sp>
+        <p:nvSpPr>
+          <p:cNvPr id="2" name="Title 1">
+            <a:extLst>
+              <a:ext uri="{FF2B5EF4-FFF2-40B4-BE49-F238E27FC236}">
+                <a16:creationId xmlns:a16="http://schemas.microsoft.com/office/drawing/2014/main" id="{0A9AAD05-9A8B-C30B-B4D9-99E3A92A99B5}"/>
+              </a:ext>
+            </a:extLst>
+          </p:cNvPr>
+          <p:cNvSpPr>
+            <a:spLocks noGrp="1"/>
+          </p:cNvSpPr>
+          <p:nvPr>
+            <p:ph type="title"/>
+          </p:nvPr>
+        </p:nvSpPr>
+        <p:spPr>
+          <a:xfrm>
+            <a:off x="674976" y="702156"/>
+            <a:ext cx="10935832" cy="630482"/>
+          </a:xfrm>
+        </p:spPr>
+        <p:txBody>
+          <a:bodyPr/>
+          <a:lstStyle/>
+          <a:p>
+            <a:r>
+              <a:rPr lang="en-US" dirty="0"/>
+              <a:t>Execution of Project (Cont.)</a:t>
+            </a:r>
+          </a:p>
+        </p:txBody>
+      </p:sp>
+      <p:sp>
+        <p:nvSpPr>
+          <p:cNvPr id="5" name="Slide Number Placeholder 4">
+            <a:extLst>
+              <a:ext uri="{FF2B5EF4-FFF2-40B4-BE49-F238E27FC236}">
+                <a16:creationId xmlns:a16="http://schemas.microsoft.com/office/drawing/2014/main" id="{57203070-D601-457B-9DF7-A4611183F29A}"/>
+              </a:ext>
+            </a:extLst>
+          </p:cNvPr>
+          <p:cNvSpPr>
+            <a:spLocks noGrp="1"/>
+          </p:cNvSpPr>
+          <p:nvPr>
+            <p:ph type="sldNum" sz="quarter" idx="12"/>
+          </p:nvPr>
+        </p:nvSpPr>
+        <p:spPr/>
+        <p:txBody>
+          <a:bodyPr/>
+          <a:lstStyle/>
+          <a:p>
+            <a:fld id="{3A98EE3D-8CD1-4C3F-BD1C-C98C9596463C}" type="slidenum">
+              <a:rPr lang="en-US" smtClean="0"/>
+              <a:t>13</a:t>
+            </a:fld>
+            <a:endParaRPr lang="en-US" dirty="0"/>
+          </a:p>
+        </p:txBody>
+      </p:sp>
+      <p:sp>
+        <p:nvSpPr>
+          <p:cNvPr id="10" name="TextBox 9">
+            <a:extLst>
+              <a:ext uri="{FF2B5EF4-FFF2-40B4-BE49-F238E27FC236}">
+                <a16:creationId xmlns:a16="http://schemas.microsoft.com/office/drawing/2014/main" id="{3710AD9B-9F24-E8D6-B646-8CCC5F54AE35}"/>
+              </a:ext>
+            </a:extLst>
+          </p:cNvPr>
+          <p:cNvSpPr txBox="1"/>
+          <p:nvPr/>
+        </p:nvSpPr>
+        <p:spPr>
+          <a:xfrm>
+            <a:off x="792206" y="1475992"/>
+            <a:ext cx="9883324" cy="1200329"/>
+          </a:xfrm>
+          <a:prstGeom prst="rect">
+            <a:avLst/>
+          </a:prstGeom>
+          <a:noFill/>
+        </p:spPr>
+        <p:txBody>
+          <a:bodyPr wrap="square">
+            <a:spAutoFit/>
+          </a:bodyPr>
+          <a:lstStyle/>
+          <a:p>
+            <a:pPr algn="l"/>
+            <a:r>
+              <a:rPr lang="en-US" b="0" i="0" dirty="0">
+                <a:solidFill>
+                  <a:srgbClr val="1F2328"/>
+                </a:solidFill>
+                <a:effectLst/>
+                <a:latin typeface="-apple-system"/>
+              </a:rPr>
+              <a:t>In the end, we use </a:t>
+            </a:r>
+            <a:r>
+              <a:rPr lang="en-US" b="0" i="0" u="sng" dirty="0" err="1">
+                <a:effectLst/>
+                <a:latin typeface="-apple-system"/>
+                <a:hlinkClick r:id="rId2"/>
+              </a:rPr>
+              <a:t>HTMAnomalyExperiment</a:t>
+            </a:r>
+            <a:r>
+              <a:rPr lang="en-US" b="0" i="0" dirty="0" err="1">
+                <a:solidFill>
+                  <a:srgbClr val="1F2328"/>
+                </a:solidFill>
+                <a:effectLst/>
+                <a:latin typeface="-apple-system"/>
+              </a:rPr>
+              <a:t>to</a:t>
+            </a:r>
+            <a:r>
+              <a:rPr lang="en-US" b="0" i="0" dirty="0">
+                <a:solidFill>
+                  <a:srgbClr val="1F2328"/>
+                </a:solidFill>
+                <a:effectLst/>
+                <a:latin typeface="-apple-system"/>
+              </a:rPr>
+              <a:t> detected anomalies in sequences read from files inside predicting folder. All the classes explained earlier- CSV files reading (</a:t>
+            </a:r>
+            <a:r>
+              <a:rPr lang="en-US" b="0" i="0" dirty="0" err="1">
+                <a:solidFill>
+                  <a:srgbClr val="1F2328"/>
+                </a:solidFill>
+                <a:effectLst/>
+                <a:latin typeface="-apple-system"/>
+              </a:rPr>
+              <a:t>CSVFileReader</a:t>
+            </a:r>
+            <a:r>
+              <a:rPr lang="en-US" b="0" i="0" dirty="0">
+                <a:solidFill>
+                  <a:srgbClr val="1F2328"/>
+                </a:solidFill>
+                <a:effectLst/>
+                <a:latin typeface="-apple-system"/>
+              </a:rPr>
+              <a:t>), combining and converting them for HTM training (</a:t>
+            </a:r>
+            <a:r>
+              <a:rPr lang="en-US" b="0" i="0" dirty="0" err="1">
+                <a:solidFill>
+                  <a:srgbClr val="1F2328"/>
+                </a:solidFill>
+                <a:effectLst/>
+                <a:latin typeface="-apple-system"/>
+              </a:rPr>
+              <a:t>CSVToHTMInput</a:t>
+            </a:r>
+            <a:r>
+              <a:rPr lang="en-US" b="0" i="0" dirty="0">
+                <a:solidFill>
+                  <a:srgbClr val="1F2328"/>
+                </a:solidFill>
+                <a:effectLst/>
+                <a:latin typeface="-apple-system"/>
+              </a:rPr>
+              <a:t>) and training the HTM engine (using </a:t>
+            </a:r>
+            <a:r>
+              <a:rPr lang="en-US" b="0" i="0" dirty="0" err="1">
+                <a:solidFill>
+                  <a:srgbClr val="1F2328"/>
+                </a:solidFill>
+                <a:effectLst/>
+                <a:latin typeface="-apple-system"/>
+              </a:rPr>
+              <a:t>HTMModelTraining</a:t>
+            </a:r>
+            <a:r>
+              <a:rPr lang="en-US" b="0" i="0" dirty="0">
+                <a:solidFill>
+                  <a:srgbClr val="1F2328"/>
+                </a:solidFill>
+                <a:effectLst/>
+                <a:latin typeface="-apple-system"/>
+              </a:rPr>
+              <a:t>) will be used here.</a:t>
+            </a:r>
+            <a:endParaRPr lang="en-US" dirty="0"/>
+          </a:p>
+        </p:txBody>
+      </p:sp>
+      <p:pic>
+        <p:nvPicPr>
+          <p:cNvPr id="4" name="Picture 3">
+            <a:extLst>
+              <a:ext uri="{FF2B5EF4-FFF2-40B4-BE49-F238E27FC236}">
+                <a16:creationId xmlns:a16="http://schemas.microsoft.com/office/drawing/2014/main" id="{91680CEF-8B3A-376C-E62A-05CAD6B89E2E}"/>
+              </a:ext>
+            </a:extLst>
+          </p:cNvPr>
+          <p:cNvPicPr>
+            <a:picLocks noChangeAspect="1"/>
+          </p:cNvPicPr>
+          <p:nvPr/>
+        </p:nvPicPr>
+        <p:blipFill>
+          <a:blip r:embed="rId3"/>
+          <a:stretch>
+            <a:fillRect/>
+          </a:stretch>
+        </p:blipFill>
+        <p:spPr>
+          <a:xfrm>
+            <a:off x="792206" y="2819675"/>
+            <a:ext cx="7582958" cy="1560128"/>
+          </a:xfrm>
+          <a:prstGeom prst="rect">
+            <a:avLst/>
+          </a:prstGeom>
+        </p:spPr>
+      </p:pic>
+      <p:sp>
+        <p:nvSpPr>
+          <p:cNvPr id="8" name="TextBox 7">
+            <a:extLst>
+              <a:ext uri="{FF2B5EF4-FFF2-40B4-BE49-F238E27FC236}">
+                <a16:creationId xmlns:a16="http://schemas.microsoft.com/office/drawing/2014/main" id="{4CC68AEC-DBA2-17BD-6292-D5299F0D2FC3}"/>
+              </a:ext>
+            </a:extLst>
+          </p:cNvPr>
+          <p:cNvSpPr txBox="1"/>
+          <p:nvPr/>
+        </p:nvSpPr>
+        <p:spPr>
+          <a:xfrm>
+            <a:off x="792205" y="4379803"/>
+            <a:ext cx="10321271" cy="646331"/>
+          </a:xfrm>
+          <a:prstGeom prst="rect">
+            <a:avLst/>
+          </a:prstGeom>
+          <a:noFill/>
+        </p:spPr>
+        <p:txBody>
+          <a:bodyPr wrap="square">
+            <a:spAutoFit/>
+          </a:bodyPr>
+          <a:lstStyle/>
+          <a:p>
+            <a:r>
+              <a:rPr lang="en-US" b="0" i="0" dirty="0">
+                <a:solidFill>
+                  <a:srgbClr val="1F2328"/>
+                </a:solidFill>
+                <a:effectLst/>
+                <a:latin typeface="-apple-system"/>
+              </a:rPr>
+              <a:t>Path to training and predicting folder is set as default and passed on the constructor, or can be set inside the class manually.</a:t>
+            </a:r>
+            <a:endParaRPr lang="en-US" dirty="0"/>
+          </a:p>
+        </p:txBody>
+      </p:sp>
+      <p:pic>
+        <p:nvPicPr>
+          <p:cNvPr id="11" name="Picture 10">
+            <a:extLst>
+              <a:ext uri="{FF2B5EF4-FFF2-40B4-BE49-F238E27FC236}">
+                <a16:creationId xmlns:a16="http://schemas.microsoft.com/office/drawing/2014/main" id="{A0CA7150-C037-D918-7607-A7EC6051B81E}"/>
+              </a:ext>
+            </a:extLst>
+          </p:cNvPr>
+          <p:cNvPicPr>
+            <a:picLocks noChangeAspect="1"/>
+          </p:cNvPicPr>
+          <p:nvPr/>
+        </p:nvPicPr>
+        <p:blipFill>
+          <a:blip r:embed="rId4"/>
+          <a:stretch>
+            <a:fillRect/>
+          </a:stretch>
+        </p:blipFill>
+        <p:spPr>
+          <a:xfrm>
+            <a:off x="792205" y="5272523"/>
+            <a:ext cx="7059010" cy="905001"/>
+          </a:xfrm>
+          <a:prstGeom prst="rect">
+            <a:avLst/>
+          </a:prstGeom>
+        </p:spPr>
+      </p:pic>
+    </p:spTree>
+    <p:extLst>
+      <p:ext uri="{BB962C8B-B14F-4D97-AF65-F5344CB8AC3E}">
+        <p14:creationId xmlns:p14="http://schemas.microsoft.com/office/powerpoint/2010/main" val="430166257"/>
+      </p:ext>
+    </p:extLst>
+  </p:cSld>
+  <p:clrMapOvr>
+    <a:masterClrMapping/>
+  </p:clrMapOvr>
+</p:sld>
+</file>
+
+<file path=ppt/slides/slide14.xml><?xml version="1.0" encoding="utf-8"?>
+<p:sld xmlns:a="http://schemas.openxmlformats.org/drawingml/2006/main" xmlns:r="http://schemas.openxmlformats.org/officeDocument/2006/relationships" xmlns:p="http://schemas.openxmlformats.org/presentationml/2006/main">
+  <p:cSld>
+    <p:spTree>
+      <p:nvGrpSpPr>
+        <p:cNvPr id="1" name=""/>
+        <p:cNvGrpSpPr/>
+        <p:nvPr/>
+      </p:nvGrpSpPr>
+      <p:grpSpPr>
+        <a:xfrm>
+          <a:off x="0" y="0"/>
+          <a:ext cx="0" cy="0"/>
+          <a:chOff x="0" y="0"/>
+          <a:chExt cx="0" cy="0"/>
+        </a:xfrm>
+      </p:grpSpPr>
+      <p:sp>
+        <p:nvSpPr>
+          <p:cNvPr id="2" name="Title 1">
+            <a:extLst>
+              <a:ext uri="{FF2B5EF4-FFF2-40B4-BE49-F238E27FC236}">
+                <a16:creationId xmlns:a16="http://schemas.microsoft.com/office/drawing/2014/main" id="{0A9AAD05-9A8B-C30B-B4D9-99E3A92A99B5}"/>
+              </a:ext>
+            </a:extLst>
+          </p:cNvPr>
+          <p:cNvSpPr>
+            <a:spLocks noGrp="1"/>
+          </p:cNvSpPr>
+          <p:nvPr>
+            <p:ph type="title"/>
+          </p:nvPr>
+        </p:nvSpPr>
+        <p:spPr>
+          <a:xfrm>
+            <a:off x="674976" y="702156"/>
+            <a:ext cx="10935832" cy="630482"/>
+          </a:xfrm>
+        </p:spPr>
+        <p:txBody>
+          <a:bodyPr/>
+          <a:lstStyle/>
+          <a:p>
+            <a:r>
+              <a:rPr lang="en-US" dirty="0"/>
+              <a:t>Execution of Project (Cont.)</a:t>
+            </a:r>
+          </a:p>
+        </p:txBody>
+      </p:sp>
+      <p:sp>
+        <p:nvSpPr>
+          <p:cNvPr id="5" name="Slide Number Placeholder 4">
+            <a:extLst>
+              <a:ext uri="{FF2B5EF4-FFF2-40B4-BE49-F238E27FC236}">
+                <a16:creationId xmlns:a16="http://schemas.microsoft.com/office/drawing/2014/main" id="{57203070-D601-457B-9DF7-A4611183F29A}"/>
+              </a:ext>
+            </a:extLst>
+          </p:cNvPr>
+          <p:cNvSpPr>
+            <a:spLocks noGrp="1"/>
+          </p:cNvSpPr>
+          <p:nvPr>
+            <p:ph type="sldNum" sz="quarter" idx="12"/>
+          </p:nvPr>
+        </p:nvSpPr>
+        <p:spPr/>
+        <p:txBody>
+          <a:bodyPr/>
+          <a:lstStyle/>
+          <a:p>
+            <a:fld id="{3A98EE3D-8CD1-4C3F-BD1C-C98C9596463C}" type="slidenum">
+              <a:rPr lang="en-US" smtClean="0"/>
+              <a:t>14</a:t>
+            </a:fld>
+            <a:endParaRPr lang="en-US" dirty="0"/>
+          </a:p>
+        </p:txBody>
+      </p:sp>
+      <p:sp>
+        <p:nvSpPr>
+          <p:cNvPr id="10" name="TextBox 9">
+            <a:extLst>
+              <a:ext uri="{FF2B5EF4-FFF2-40B4-BE49-F238E27FC236}">
+                <a16:creationId xmlns:a16="http://schemas.microsoft.com/office/drawing/2014/main" id="{3710AD9B-9F24-E8D6-B646-8CCC5F54AE35}"/>
+              </a:ext>
+            </a:extLst>
+          </p:cNvPr>
+          <p:cNvSpPr txBox="1"/>
+          <p:nvPr/>
+        </p:nvSpPr>
+        <p:spPr>
+          <a:xfrm>
+            <a:off x="792206" y="1475992"/>
+            <a:ext cx="9883324" cy="646331"/>
+          </a:xfrm>
+          <a:prstGeom prst="rect">
+            <a:avLst/>
+          </a:prstGeom>
+          <a:noFill/>
+        </p:spPr>
+        <p:txBody>
+          <a:bodyPr wrap="square">
+            <a:spAutoFit/>
+          </a:bodyPr>
+          <a:lstStyle/>
+          <a:p>
+            <a:pPr algn="l"/>
+            <a:r>
+              <a:rPr lang="en-US" b="0" i="0" dirty="0">
+                <a:solidFill>
+                  <a:srgbClr val="1F2328"/>
+                </a:solidFill>
+                <a:effectLst/>
+                <a:latin typeface="-apple-system"/>
+              </a:rPr>
+              <a:t>In the end, </a:t>
+            </a:r>
+            <a:r>
+              <a:rPr lang="en-US" b="0" i="0" dirty="0" err="1">
+                <a:solidFill>
+                  <a:srgbClr val="1F2328"/>
+                </a:solidFill>
+                <a:effectLst/>
+                <a:latin typeface="-apple-system"/>
+              </a:rPr>
+              <a:t>DetectAnomaly</a:t>
+            </a:r>
+            <a:r>
+              <a:rPr lang="en-US" b="0" i="0" dirty="0">
+                <a:solidFill>
+                  <a:srgbClr val="1F2328"/>
+                </a:solidFill>
+                <a:effectLst/>
+                <a:latin typeface="-apple-system"/>
+              </a:rPr>
+              <a:t> method is used to detect anomalies in our trimmed sequences one by one, using our trained HTM Model predictor.</a:t>
+            </a:r>
+            <a:endParaRPr lang="en-US" dirty="0"/>
+          </a:p>
+        </p:txBody>
+      </p:sp>
+      <p:pic>
+        <p:nvPicPr>
+          <p:cNvPr id="6" name="Picture 5">
+            <a:extLst>
+              <a:ext uri="{FF2B5EF4-FFF2-40B4-BE49-F238E27FC236}">
+                <a16:creationId xmlns:a16="http://schemas.microsoft.com/office/drawing/2014/main" id="{9B840754-171B-8DC0-393E-9B661E85DCE5}"/>
+              </a:ext>
+            </a:extLst>
+          </p:cNvPr>
+          <p:cNvPicPr>
+            <a:picLocks noChangeAspect="1"/>
+          </p:cNvPicPr>
+          <p:nvPr/>
+        </p:nvPicPr>
+        <p:blipFill>
+          <a:blip r:embed="rId2"/>
+          <a:stretch>
+            <a:fillRect/>
+          </a:stretch>
+        </p:blipFill>
+        <p:spPr>
+          <a:xfrm>
+            <a:off x="792206" y="2449326"/>
+            <a:ext cx="6744641" cy="1428949"/>
+          </a:xfrm>
+          <a:prstGeom prst="rect">
+            <a:avLst/>
+          </a:prstGeom>
+        </p:spPr>
+      </p:pic>
+      <p:sp>
+        <p:nvSpPr>
+          <p:cNvPr id="8" name="TextBox 7">
+            <a:extLst>
+              <a:ext uri="{FF2B5EF4-FFF2-40B4-BE49-F238E27FC236}">
+                <a16:creationId xmlns:a16="http://schemas.microsoft.com/office/drawing/2014/main" id="{28EB8013-A253-B676-582F-3F3F37CBA901}"/>
+              </a:ext>
+            </a:extLst>
+          </p:cNvPr>
+          <p:cNvSpPr txBox="1"/>
+          <p:nvPr/>
+        </p:nvSpPr>
+        <p:spPr>
+          <a:xfrm>
+            <a:off x="674976" y="3878275"/>
+            <a:ext cx="10724818" cy="923330"/>
+          </a:xfrm>
+          <a:prstGeom prst="rect">
+            <a:avLst/>
+          </a:prstGeom>
+          <a:noFill/>
+        </p:spPr>
+        <p:txBody>
+          <a:bodyPr wrap="square">
+            <a:spAutoFit/>
+          </a:bodyPr>
+          <a:lstStyle/>
+          <a:p>
+            <a:r>
+              <a:rPr lang="en-US" b="0" i="0" u="sng" dirty="0" err="1">
+                <a:effectLst/>
+                <a:latin typeface="-apple-system"/>
+                <a:hlinkClick r:id="rId3"/>
+              </a:rPr>
+              <a:t>DetectAnomaly</a:t>
+            </a:r>
+            <a:r>
+              <a:rPr lang="en-US" b="0" i="0" dirty="0">
+                <a:solidFill>
+                  <a:srgbClr val="1F2328"/>
+                </a:solidFill>
+                <a:effectLst/>
+                <a:latin typeface="-apple-system"/>
+              </a:rPr>
+              <a:t> is the main method from </a:t>
+            </a:r>
+            <a:r>
+              <a:rPr lang="en-US" b="0" i="0" dirty="0" err="1">
+                <a:solidFill>
+                  <a:srgbClr val="1F2328"/>
+                </a:solidFill>
+                <a:effectLst/>
+                <a:latin typeface="-apple-system"/>
+              </a:rPr>
+              <a:t>ExtractSequencesFromFolder</a:t>
+            </a:r>
+            <a:r>
+              <a:rPr lang="en-US" b="0" i="0" dirty="0">
+                <a:solidFill>
+                  <a:srgbClr val="1F2328"/>
+                </a:solidFill>
+                <a:effectLst/>
+                <a:latin typeface="-apple-system"/>
+              </a:rPr>
+              <a:t> class which detects anomalies in our data. It traverses each value of a list one by one in a sliding window manner, and uses trained model predictor to predict the next element for comparison. </a:t>
+            </a:r>
+            <a:endParaRPr lang="en-US" dirty="0"/>
+          </a:p>
+        </p:txBody>
+      </p:sp>
+      <p:pic>
+        <p:nvPicPr>
+          <p:cNvPr id="11" name="Picture 10">
+            <a:extLst>
+              <a:ext uri="{FF2B5EF4-FFF2-40B4-BE49-F238E27FC236}">
+                <a16:creationId xmlns:a16="http://schemas.microsoft.com/office/drawing/2014/main" id="{63296744-9891-84A8-5F05-D4E359E00147}"/>
+              </a:ext>
+            </a:extLst>
+          </p:cNvPr>
+          <p:cNvPicPr>
+            <a:picLocks noChangeAspect="1"/>
+          </p:cNvPicPr>
+          <p:nvPr/>
+        </p:nvPicPr>
+        <p:blipFill>
+          <a:blip r:embed="rId4"/>
+          <a:stretch>
+            <a:fillRect/>
+          </a:stretch>
+        </p:blipFill>
+        <p:spPr>
+          <a:xfrm>
+            <a:off x="792206" y="5301362"/>
+            <a:ext cx="3905795" cy="457264"/>
+          </a:xfrm>
+          <a:prstGeom prst="rect">
+            <a:avLst/>
+          </a:prstGeom>
+        </p:spPr>
+      </p:pic>
+    </p:spTree>
+    <p:extLst>
+      <p:ext uri="{BB962C8B-B14F-4D97-AF65-F5344CB8AC3E}">
+        <p14:creationId xmlns:p14="http://schemas.microsoft.com/office/powerpoint/2010/main" val="2526094258"/>
+      </p:ext>
+    </p:extLst>
+  </p:cSld>
+  <p:clrMapOvr>
+    <a:masterClrMapping/>
+  </p:clrMapOvr>
+</p:sld>
+</file>
+
+<file path=ppt/slides/slide15.xml><?xml version="1.0" encoding="utf-8"?>
+<p:sld xmlns:a="http://schemas.openxmlformats.org/drawingml/2006/main" xmlns:r="http://schemas.openxmlformats.org/officeDocument/2006/relationships" xmlns:p="http://schemas.openxmlformats.org/presentationml/2006/main">
+  <p:cSld>
+    <p:spTree>
+      <p:nvGrpSpPr>
+        <p:cNvPr id="1" name=""/>
+        <p:cNvGrpSpPr/>
+        <p:nvPr/>
+      </p:nvGrpSpPr>
+      <p:grpSpPr>
+        <a:xfrm>
+          <a:off x="0" y="0"/>
+          <a:ext cx="0" cy="0"/>
+          <a:chOff x="0" y="0"/>
+          <a:chExt cx="0" cy="0"/>
+        </a:xfrm>
+      </p:grpSpPr>
+      <p:sp>
+        <p:nvSpPr>
+          <p:cNvPr id="2" name="Title 1">
+            <a:extLst>
+              <a:ext uri="{FF2B5EF4-FFF2-40B4-BE49-F238E27FC236}">
+                <a16:creationId xmlns:a16="http://schemas.microsoft.com/office/drawing/2014/main" id="{0A9AAD05-9A8B-C30B-B4D9-99E3A92A99B5}"/>
+              </a:ext>
+            </a:extLst>
+          </p:cNvPr>
+          <p:cNvSpPr>
+            <a:spLocks noGrp="1"/>
+          </p:cNvSpPr>
+          <p:nvPr>
+            <p:ph type="title"/>
+          </p:nvPr>
+        </p:nvSpPr>
+        <p:spPr>
+          <a:xfrm>
+            <a:off x="674976" y="702156"/>
+            <a:ext cx="10935832" cy="630482"/>
+          </a:xfrm>
+        </p:spPr>
+        <p:txBody>
+          <a:bodyPr/>
+          <a:lstStyle/>
+          <a:p>
+            <a:r>
+              <a:rPr lang="en-US" dirty="0"/>
+              <a:t>Execution of Project (Cont.)</a:t>
+            </a:r>
+          </a:p>
+        </p:txBody>
+      </p:sp>
+      <p:sp>
+        <p:nvSpPr>
+          <p:cNvPr id="5" name="Slide Number Placeholder 4">
+            <a:extLst>
+              <a:ext uri="{FF2B5EF4-FFF2-40B4-BE49-F238E27FC236}">
+                <a16:creationId xmlns:a16="http://schemas.microsoft.com/office/drawing/2014/main" id="{57203070-D601-457B-9DF7-A4611183F29A}"/>
+              </a:ext>
+            </a:extLst>
+          </p:cNvPr>
+          <p:cNvSpPr>
+            <a:spLocks noGrp="1"/>
+          </p:cNvSpPr>
+          <p:nvPr>
+            <p:ph type="sldNum" sz="quarter" idx="12"/>
+          </p:nvPr>
+        </p:nvSpPr>
+        <p:spPr/>
+        <p:txBody>
+          <a:bodyPr/>
+          <a:lstStyle/>
+          <a:p>
+            <a:fld id="{3A98EE3D-8CD1-4C3F-BD1C-C98C9596463C}" type="slidenum">
+              <a:rPr lang="en-US" smtClean="0"/>
+              <a:t>15</a:t>
+            </a:fld>
+            <a:endParaRPr lang="en-US" dirty="0"/>
+          </a:p>
+        </p:txBody>
+      </p:sp>
+      <p:sp>
+        <p:nvSpPr>
+          <p:cNvPr id="10" name="TextBox 9">
+            <a:extLst>
+              <a:ext uri="{FF2B5EF4-FFF2-40B4-BE49-F238E27FC236}">
+                <a16:creationId xmlns:a16="http://schemas.microsoft.com/office/drawing/2014/main" id="{3710AD9B-9F24-E8D6-B646-8CCC5F54AE35}"/>
+              </a:ext>
+            </a:extLst>
+          </p:cNvPr>
+          <p:cNvSpPr txBox="1"/>
+          <p:nvPr/>
+        </p:nvSpPr>
+        <p:spPr>
+          <a:xfrm>
+            <a:off x="792206" y="1475992"/>
+            <a:ext cx="9883324" cy="646331"/>
+          </a:xfrm>
+          <a:prstGeom prst="rect">
+            <a:avLst/>
+          </a:prstGeom>
+          <a:noFill/>
+        </p:spPr>
+        <p:txBody>
+          <a:bodyPr wrap="square">
+            <a:spAutoFit/>
+          </a:bodyPr>
+          <a:lstStyle/>
+          <a:p>
+            <a:pPr algn="l"/>
+            <a:r>
+              <a:rPr lang="en-US" b="0" i="0" dirty="0">
+                <a:solidFill>
+                  <a:srgbClr val="1F2328"/>
+                </a:solidFill>
+                <a:effectLst/>
+                <a:latin typeface="-apple-system"/>
+              </a:rPr>
+              <a:t>Here, assume that item passed to the model is of int type with value 8. We can use this to analyze how prediction works. When this is executed,</a:t>
+            </a:r>
+            <a:endParaRPr lang="en-US" dirty="0"/>
+          </a:p>
+        </p:txBody>
+      </p:sp>
+      <p:sp>
+        <p:nvSpPr>
+          <p:cNvPr id="8" name="TextBox 7">
+            <a:extLst>
+              <a:ext uri="{FF2B5EF4-FFF2-40B4-BE49-F238E27FC236}">
+                <a16:creationId xmlns:a16="http://schemas.microsoft.com/office/drawing/2014/main" id="{28EB8013-A253-B676-582F-3F3F37CBA901}"/>
+              </a:ext>
+            </a:extLst>
+          </p:cNvPr>
+          <p:cNvSpPr txBox="1"/>
+          <p:nvPr/>
+        </p:nvSpPr>
+        <p:spPr>
+          <a:xfrm>
+            <a:off x="674976" y="3878275"/>
+            <a:ext cx="10724818" cy="369332"/>
+          </a:xfrm>
+          <a:prstGeom prst="rect">
+            <a:avLst/>
+          </a:prstGeom>
+          <a:noFill/>
+        </p:spPr>
+        <p:txBody>
+          <a:bodyPr wrap="square">
+            <a:spAutoFit/>
+          </a:bodyPr>
+          <a:lstStyle/>
+          <a:p>
+            <a:r>
+              <a:rPr lang="en-US" b="0" i="0" dirty="0">
+                <a:solidFill>
+                  <a:srgbClr val="1F2328"/>
+                </a:solidFill>
+                <a:effectLst/>
+                <a:latin typeface="-apple-system"/>
+              </a:rPr>
+              <a:t>We get the following output.</a:t>
+            </a:r>
+            <a:endParaRPr lang="en-US" dirty="0"/>
+          </a:p>
+        </p:txBody>
+      </p:sp>
+      <p:pic>
+        <p:nvPicPr>
+          <p:cNvPr id="4" name="Picture 3">
+            <a:extLst>
+              <a:ext uri="{FF2B5EF4-FFF2-40B4-BE49-F238E27FC236}">
+                <a16:creationId xmlns:a16="http://schemas.microsoft.com/office/drawing/2014/main" id="{2CCF0E66-1FAD-2F05-A345-BF521205AA58}"/>
+              </a:ext>
+            </a:extLst>
+          </p:cNvPr>
+          <p:cNvPicPr>
+            <a:picLocks noChangeAspect="1"/>
+          </p:cNvPicPr>
+          <p:nvPr/>
+        </p:nvPicPr>
+        <p:blipFill>
+          <a:blip r:embed="rId2"/>
+          <a:stretch>
+            <a:fillRect/>
+          </a:stretch>
+        </p:blipFill>
+        <p:spPr>
+          <a:xfrm>
+            <a:off x="792206" y="2349300"/>
+            <a:ext cx="7630590" cy="1019317"/>
+          </a:xfrm>
+          <a:prstGeom prst="rect">
+            <a:avLst/>
+          </a:prstGeom>
+        </p:spPr>
+      </p:pic>
+      <p:pic>
+        <p:nvPicPr>
+          <p:cNvPr id="9" name="Picture 8">
+            <a:extLst>
+              <a:ext uri="{FF2B5EF4-FFF2-40B4-BE49-F238E27FC236}">
+                <a16:creationId xmlns:a16="http://schemas.microsoft.com/office/drawing/2014/main" id="{4CFD010F-BF09-73AD-9DA9-D6D7D842CE92}"/>
+              </a:ext>
+            </a:extLst>
+          </p:cNvPr>
+          <p:cNvPicPr>
+            <a:picLocks noChangeAspect="1"/>
+          </p:cNvPicPr>
+          <p:nvPr/>
+        </p:nvPicPr>
+        <p:blipFill>
+          <a:blip r:embed="rId3"/>
+          <a:stretch>
+            <a:fillRect/>
+          </a:stretch>
+        </p:blipFill>
+        <p:spPr>
+          <a:xfrm>
+            <a:off x="674976" y="4667960"/>
+            <a:ext cx="4458322" cy="1105054"/>
+          </a:xfrm>
+          <a:prstGeom prst="rect">
+            <a:avLst/>
+          </a:prstGeom>
+        </p:spPr>
+      </p:pic>
+    </p:spTree>
+    <p:extLst>
+      <p:ext uri="{BB962C8B-B14F-4D97-AF65-F5344CB8AC3E}">
+        <p14:creationId xmlns:p14="http://schemas.microsoft.com/office/powerpoint/2010/main" val="3863329770"/>
+      </p:ext>
+    </p:extLst>
+  </p:cSld>
+  <p:clrMapOvr>
+    <a:masterClrMapping/>
+  </p:clrMapOvr>
+</p:sld>
+</file>
+
+<file path=ppt/slides/slide16.xml><?xml version="1.0" encoding="utf-8"?>
+<p:sld xmlns:a="http://schemas.openxmlformats.org/drawingml/2006/main" xmlns:r="http://schemas.openxmlformats.org/officeDocument/2006/relationships" xmlns:p="http://schemas.openxmlformats.org/presentationml/2006/main">
+  <p:cSld>
+    <p:spTree>
+      <p:nvGrpSpPr>
+        <p:cNvPr id="1" name=""/>
+        <p:cNvGrpSpPr/>
+        <p:nvPr/>
+      </p:nvGrpSpPr>
+      <p:grpSpPr>
+        <a:xfrm>
+          <a:off x="0" y="0"/>
+          <a:ext cx="0" cy="0"/>
+          <a:chOff x="0" y="0"/>
+          <a:chExt cx="0" cy="0"/>
+        </a:xfrm>
+      </p:grpSpPr>
+      <p:sp>
+        <p:nvSpPr>
+          <p:cNvPr id="2" name="Title 1">
+            <a:extLst>
+              <a:ext uri="{FF2B5EF4-FFF2-40B4-BE49-F238E27FC236}">
+                <a16:creationId xmlns:a16="http://schemas.microsoft.com/office/drawing/2014/main" id="{0A9AAD05-9A8B-C30B-B4D9-99E3A92A99B5}"/>
+              </a:ext>
+            </a:extLst>
+          </p:cNvPr>
+          <p:cNvSpPr>
+            <a:spLocks noGrp="1"/>
+          </p:cNvSpPr>
+          <p:nvPr>
+            <p:ph type="title"/>
+          </p:nvPr>
+        </p:nvSpPr>
+        <p:spPr>
+          <a:xfrm>
+            <a:off x="674976" y="702156"/>
+            <a:ext cx="10935832" cy="630482"/>
+          </a:xfrm>
+        </p:spPr>
+        <p:txBody>
+          <a:bodyPr/>
+          <a:lstStyle/>
+          <a:p>
+            <a:r>
+              <a:rPr lang="en-US" dirty="0"/>
+              <a:t>Execution of Project (Cont.)</a:t>
+            </a:r>
+          </a:p>
+        </p:txBody>
+      </p:sp>
+      <p:sp>
+        <p:nvSpPr>
+          <p:cNvPr id="5" name="Slide Number Placeholder 4">
+            <a:extLst>
+              <a:ext uri="{FF2B5EF4-FFF2-40B4-BE49-F238E27FC236}">
+                <a16:creationId xmlns:a16="http://schemas.microsoft.com/office/drawing/2014/main" id="{57203070-D601-457B-9DF7-A4611183F29A}"/>
+              </a:ext>
+            </a:extLst>
+          </p:cNvPr>
+          <p:cNvSpPr>
+            <a:spLocks noGrp="1"/>
+          </p:cNvSpPr>
+          <p:nvPr>
+            <p:ph type="sldNum" sz="quarter" idx="12"/>
+          </p:nvPr>
+        </p:nvSpPr>
+        <p:spPr/>
+        <p:txBody>
+          <a:bodyPr/>
+          <a:lstStyle/>
+          <a:p>
+            <a:fld id="{3A98EE3D-8CD1-4C3F-BD1C-C98C9596463C}" type="slidenum">
+              <a:rPr lang="en-US" smtClean="0"/>
+              <a:t>16</a:t>
+            </a:fld>
+            <a:endParaRPr lang="en-US" dirty="0"/>
+          </a:p>
+        </p:txBody>
+      </p:sp>
+      <p:sp>
+        <p:nvSpPr>
+          <p:cNvPr id="10" name="TextBox 9">
+            <a:extLst>
+              <a:ext uri="{FF2B5EF4-FFF2-40B4-BE49-F238E27FC236}">
+                <a16:creationId xmlns:a16="http://schemas.microsoft.com/office/drawing/2014/main" id="{3710AD9B-9F24-E8D6-B646-8CCC5F54AE35}"/>
+              </a:ext>
+            </a:extLst>
+          </p:cNvPr>
+          <p:cNvSpPr txBox="1"/>
+          <p:nvPr/>
+        </p:nvSpPr>
+        <p:spPr>
+          <a:xfrm>
+            <a:off x="792206" y="1475992"/>
+            <a:ext cx="9883324" cy="3970318"/>
+          </a:xfrm>
+          <a:prstGeom prst="rect">
+            <a:avLst/>
+          </a:prstGeom>
+          <a:noFill/>
+        </p:spPr>
+        <p:txBody>
+          <a:bodyPr wrap="square">
+            <a:spAutoFit/>
+          </a:bodyPr>
+          <a:lstStyle/>
+          <a:p>
+            <a:pPr algn="l"/>
+            <a:r>
+              <a:rPr lang="en-US" b="0" i="0" dirty="0">
+                <a:solidFill>
+                  <a:srgbClr val="1F2328"/>
+                </a:solidFill>
+                <a:effectLst/>
+                <a:latin typeface="-apple-system"/>
+              </a:rPr>
+              <a:t>We will then use this to detect anomalies.</a:t>
+            </a:r>
+          </a:p>
+          <a:p>
+            <a:pPr marL="285750" indent="-285750" algn="l">
+              <a:buFont typeface="Wingdings" panose="05000000000000000000" pitchFamily="2" charset="2"/>
+              <a:buChar char="§"/>
+            </a:pPr>
+            <a:endParaRPr lang="en-US" b="0" i="0" dirty="0">
+              <a:solidFill>
+                <a:srgbClr val="1F2328"/>
+              </a:solidFill>
+              <a:effectLst/>
+              <a:latin typeface="-apple-system"/>
+            </a:endParaRPr>
+          </a:p>
+          <a:p>
+            <a:pPr marL="285750" indent="-285750" algn="l">
+              <a:buFont typeface="Wingdings" panose="05000000000000000000" pitchFamily="2" charset="2"/>
+              <a:buChar char="§"/>
+            </a:pPr>
+            <a:r>
+              <a:rPr lang="en-US" b="0" i="0" dirty="0">
+                <a:solidFill>
+                  <a:srgbClr val="1F2328"/>
+                </a:solidFill>
+                <a:effectLst/>
+                <a:latin typeface="-apple-system"/>
+              </a:rPr>
+              <a:t>When we iteratively pass values to </a:t>
+            </a:r>
+            <a:r>
+              <a:rPr lang="en-US" b="0" i="0" dirty="0" err="1">
+                <a:solidFill>
+                  <a:srgbClr val="1F2328"/>
+                </a:solidFill>
+                <a:effectLst/>
+                <a:latin typeface="-apple-system"/>
+              </a:rPr>
+              <a:t>DetectAnomaly</a:t>
+            </a:r>
+            <a:r>
+              <a:rPr lang="en-US" b="0" i="0" dirty="0">
+                <a:solidFill>
+                  <a:srgbClr val="1F2328"/>
+                </a:solidFill>
+                <a:effectLst/>
+                <a:latin typeface="-apple-system"/>
+              </a:rPr>
+              <a:t> method using our sliding window approach, we will not be able to detect anomaly in the first element. So, in the beginning, we use the second element of the list to predict and compare the previous element (which is the first element). A flag is set to control the command execution; if the first element has anomaly, then we will not use it to detect our second element. We will directly start from second element. Otherwise, we will start from first element as usual.</a:t>
+            </a:r>
+          </a:p>
+          <a:p>
+            <a:pPr algn="l"/>
+            <a:endParaRPr lang="en-US" b="0" i="0" dirty="0">
+              <a:solidFill>
+                <a:srgbClr val="1F2328"/>
+              </a:solidFill>
+              <a:effectLst/>
+              <a:latin typeface="-apple-system"/>
+            </a:endParaRPr>
+          </a:p>
+          <a:p>
+            <a:pPr marL="285750" indent="-285750" algn="l">
+              <a:buFont typeface="Wingdings" panose="05000000000000000000" pitchFamily="2" charset="2"/>
+              <a:buChar char="§"/>
+            </a:pPr>
+            <a:r>
+              <a:rPr lang="en-US" b="0" i="0" dirty="0">
+                <a:solidFill>
+                  <a:srgbClr val="1F2328"/>
+                </a:solidFill>
+                <a:effectLst/>
+                <a:latin typeface="-apple-system"/>
+              </a:rPr>
+              <a:t>Now, when we traverse the list one by one to the right, we pass the value to the predictor to get the next value and compare the prediction with the actual value. If there's anomaly, then it is outputted to the user, and the anomalous element is skipped. Upon reaching to the last element, we can end our traversal and move on to next list.</a:t>
+            </a:r>
+          </a:p>
+          <a:p>
+            <a:pPr algn="l"/>
+            <a:endParaRPr lang="en-US" dirty="0"/>
+          </a:p>
+        </p:txBody>
+      </p:sp>
+    </p:spTree>
+    <p:extLst>
+      <p:ext uri="{BB962C8B-B14F-4D97-AF65-F5344CB8AC3E}">
+        <p14:creationId xmlns:p14="http://schemas.microsoft.com/office/powerpoint/2010/main" val="4155888328"/>
+      </p:ext>
+    </p:extLst>
+  </p:cSld>
+  <p:clrMapOvr>
+    <a:masterClrMapping/>
+  </p:clrMapOvr>
+</p:sld>
+</file>
+
+<file path=ppt/slides/slide17.xml><?xml version="1.0" encoding="utf-8"?>
+<p:sld xmlns:a="http://schemas.openxmlformats.org/drawingml/2006/main" xmlns:r="http://schemas.openxmlformats.org/officeDocument/2006/relationships" xmlns:p="http://schemas.openxmlformats.org/presentationml/2006/main">
+  <p:cSld>
     <p:bg>
       <p:bgPr>
         <a:solidFill>
@@ -11650,10 +13337,10 @@
       </p:grpSpPr>
       <p:sp useBgFill="1">
         <p:nvSpPr>
-          <p:cNvPr id="13" name="Rectangle 12">
+          <p:cNvPr id="19" name="Rectangle 18">
             <a:extLst>
               <a:ext uri="{FF2B5EF4-FFF2-40B4-BE49-F238E27FC236}">
-                <a16:creationId xmlns:a16="http://schemas.microsoft.com/office/drawing/2014/main" id="{F92989FB-1024-49B7-BDF1-B3CE27D48623}"/>
+                <a16:creationId xmlns:a16="http://schemas.microsoft.com/office/drawing/2014/main" id="{F875149D-F692-45DA-8324-D5E0193D5FC4}"/>
               </a:ext>
               <a:ext uri="{C183D7F6-B498-43B3-948B-1728B52AA6E4}">
                 <adec:decorative xmlns:adec="http://schemas.microsoft.com/office/drawing/2017/decorative" val="1"/>
@@ -11710,138 +13397,10 @@
       </p:sp>
       <p:sp>
         <p:nvSpPr>
-          <p:cNvPr id="7" name="Title 3">
+          <p:cNvPr id="21" name="Rectangle 20">
             <a:extLst>
               <a:ext uri="{FF2B5EF4-FFF2-40B4-BE49-F238E27FC236}">
-                <a16:creationId xmlns:a16="http://schemas.microsoft.com/office/drawing/2014/main" id="{AA9E537E-8F1D-CE1E-C433-D916E2A818CB}"/>
-              </a:ext>
-            </a:extLst>
-          </p:cNvPr>
-          <p:cNvSpPr txBox="1">
-            <a:spLocks/>
-          </p:cNvSpPr>
-          <p:nvPr/>
-        </p:nvSpPr>
-        <p:spPr>
-          <a:xfrm>
-            <a:off x="746228" y="1037967"/>
-            <a:ext cx="3054091" cy="4709131"/>
-          </a:xfrm>
-          <a:prstGeom prst="rect">
-            <a:avLst/>
-          </a:prstGeom>
-        </p:spPr>
-        <p:txBody>
-          <a:bodyPr vert="horz" lIns="91440" tIns="45720" rIns="91440" bIns="45720" rtlCol="0" anchor="ctr" anchorCtr="0">
-            <a:normAutofit/>
-          </a:bodyPr>
-          <a:lstStyle>
-            <a:lvl1pPr algn="l" defTabSz="457200" rtl="0" eaLnBrk="1" latinLnBrk="0" hangingPunct="1">
-              <a:lnSpc>
-                <a:spcPct val="100000"/>
-              </a:lnSpc>
-              <a:spcBef>
-                <a:spcPct val="0"/>
-              </a:spcBef>
-              <a:buNone/>
-              <a:defRPr sz="2800" b="0" kern="1200" cap="all">
-                <a:solidFill>
-                  <a:schemeClr val="tx1">
-                    <a:lumMod val="75000"/>
-                    <a:lumOff val="25000"/>
-                  </a:schemeClr>
-                </a:solidFill>
-                <a:latin typeface="+mj-lt"/>
-                <a:ea typeface="+mj-ea"/>
-                <a:cs typeface="+mj-cs"/>
-              </a:defRPr>
-            </a:lvl1pPr>
-            <a:lvl2pPr eaLnBrk="1" hangingPunct="1">
-              <a:defRPr>
-                <a:solidFill>
-                  <a:schemeClr val="tx2"/>
-                </a:solidFill>
-              </a:defRPr>
-            </a:lvl2pPr>
-            <a:lvl3pPr eaLnBrk="1" hangingPunct="1">
-              <a:defRPr>
-                <a:solidFill>
-                  <a:schemeClr val="tx2"/>
-                </a:solidFill>
-              </a:defRPr>
-            </a:lvl3pPr>
-            <a:lvl4pPr eaLnBrk="1" hangingPunct="1">
-              <a:defRPr>
-                <a:solidFill>
-                  <a:schemeClr val="tx2"/>
-                </a:solidFill>
-              </a:defRPr>
-            </a:lvl4pPr>
-            <a:lvl5pPr eaLnBrk="1" hangingPunct="1">
-              <a:defRPr>
-                <a:solidFill>
-                  <a:schemeClr val="tx2"/>
-                </a:solidFill>
-              </a:defRPr>
-            </a:lvl5pPr>
-            <a:lvl6pPr eaLnBrk="1" hangingPunct="1">
-              <a:defRPr>
-                <a:solidFill>
-                  <a:schemeClr val="tx2"/>
-                </a:solidFill>
-              </a:defRPr>
-            </a:lvl6pPr>
-            <a:lvl7pPr eaLnBrk="1" hangingPunct="1">
-              <a:defRPr>
-                <a:solidFill>
-                  <a:schemeClr val="tx2"/>
-                </a:solidFill>
-              </a:defRPr>
-            </a:lvl7pPr>
-            <a:lvl8pPr eaLnBrk="1" hangingPunct="1">
-              <a:defRPr>
-                <a:solidFill>
-                  <a:schemeClr val="tx2"/>
-                </a:solidFill>
-              </a:defRPr>
-            </a:lvl8pPr>
-            <a:lvl9pPr eaLnBrk="1" hangingPunct="1">
-              <a:defRPr>
-                <a:solidFill>
-                  <a:schemeClr val="tx2"/>
-                </a:solidFill>
-              </a:defRPr>
-            </a:lvl9pPr>
-          </a:lstStyle>
-          <a:p>
-            <a:pPr>
-              <a:spcAft>
-                <a:spcPts val="600"/>
-              </a:spcAft>
-            </a:pPr>
-            <a:r>
-              <a:rPr lang="en-US" b="0" kern="1200" cap="all" dirty="0">
-                <a:solidFill>
-                  <a:schemeClr val="tx1">
-                    <a:lumMod val="75000"/>
-                    <a:lumOff val="25000"/>
-                  </a:schemeClr>
-                </a:solidFill>
-                <a:latin typeface="+mj-lt"/>
-                <a:ea typeface="+mj-ea"/>
-                <a:cs typeface="+mj-cs"/>
-              </a:rPr>
-              <a:t>conclusion</a:t>
-            </a:r>
-          </a:p>
-        </p:txBody>
-      </p:sp>
-      <p:sp>
-        <p:nvSpPr>
-          <p:cNvPr id="15" name="Rectangle 14">
-            <a:extLst>
-              <a:ext uri="{FF2B5EF4-FFF2-40B4-BE49-F238E27FC236}">
-                <a16:creationId xmlns:a16="http://schemas.microsoft.com/office/drawing/2014/main" id="{2987D6F4-EC95-4EF1-A8AD-4B70386CEEC7}"/>
+                <a16:creationId xmlns:a16="http://schemas.microsoft.com/office/drawing/2014/main" id="{C0B19935-C760-4698-9DD1-973C8A428D26}"/>
               </a:ext>
               <a:ext uri="{C183D7F6-B498-43B3-948B-1728B52AA6E4}">
                 <adec:decorative xmlns:adec="http://schemas.microsoft.com/office/drawing/2017/decorative" val="1"/>
@@ -11899,6 +13458,790 @@
       </p:sp>
       <p:sp>
         <p:nvSpPr>
+          <p:cNvPr id="23" name="Rectangle 22">
+            <a:extLst>
+              <a:ext uri="{FF2B5EF4-FFF2-40B4-BE49-F238E27FC236}">
+                <a16:creationId xmlns:a16="http://schemas.microsoft.com/office/drawing/2014/main" id="{08990612-E008-4F02-AEBB-B140BE753558}"/>
+              </a:ext>
+              <a:ext uri="{C183D7F6-B498-43B3-948B-1728B52AA6E4}">
+                <adec:decorative xmlns:adec="http://schemas.microsoft.com/office/drawing/2017/decorative" val="1"/>
+              </a:ext>
+            </a:extLst>
+          </p:cNvPr>
+          <p:cNvSpPr>
+            <a:spLocks noGrp="1" noRot="1" noChangeAspect="1" noMove="1" noResize="1" noEditPoints="1" noAdjustHandles="1" noChangeArrowheads="1" noChangeShapeType="1" noTextEdit="1"/>
+          </p:cNvSpPr>
+          <p:nvPr>
+            <p:extLst>
+              <p:ext uri="{386F3935-93C4-4BCD-93E2-E3B085C9AB24}">
+                <p16:designElem xmlns:p16="http://schemas.microsoft.com/office/powerpoint/2015/main" val="1"/>
+              </p:ext>
+            </p:extLst>
+          </p:nvPr>
+        </p:nvSpPr>
+        <p:spPr>
+          <a:xfrm>
+            <a:off x="4241830" y="457200"/>
+            <a:ext cx="3703320" cy="91440"/>
+          </a:xfrm>
+          <a:prstGeom prst="rect">
+            <a:avLst/>
+          </a:prstGeom>
+          <a:solidFill>
+            <a:schemeClr val="accent1"/>
+          </a:solidFill>
+          <a:ln>
+            <a:noFill/>
+          </a:ln>
+          <a:effectLst/>
+        </p:spPr>
+        <p:style>
+          <a:lnRef idx="1">
+            <a:schemeClr val="accent1"/>
+          </a:lnRef>
+          <a:fillRef idx="3">
+            <a:schemeClr val="accent1"/>
+          </a:fillRef>
+          <a:effectRef idx="2">
+            <a:schemeClr val="accent1"/>
+          </a:effectRef>
+          <a:fontRef idx="minor">
+            <a:schemeClr val="lt1"/>
+          </a:fontRef>
+        </p:style>
+        <p:txBody>
+          <a:bodyPr/>
+          <a:lstStyle/>
+          <a:p>
+            <a:endParaRPr lang="en-US"/>
+          </a:p>
+        </p:txBody>
+      </p:sp>
+      <p:sp>
+        <p:nvSpPr>
+          <p:cNvPr id="25" name="Rectangle 24">
+            <a:extLst>
+              <a:ext uri="{FF2B5EF4-FFF2-40B4-BE49-F238E27FC236}">
+                <a16:creationId xmlns:a16="http://schemas.microsoft.com/office/drawing/2014/main" id="{A310A41F-3A14-4150-B6CF-0A577DDDEAD2}"/>
+              </a:ext>
+              <a:ext uri="{C183D7F6-B498-43B3-948B-1728B52AA6E4}">
+                <adec:decorative xmlns:adec="http://schemas.microsoft.com/office/drawing/2017/decorative" val="1"/>
+              </a:ext>
+            </a:extLst>
+          </p:cNvPr>
+          <p:cNvSpPr>
+            <a:spLocks noGrp="1" noRot="1" noChangeAspect="1" noMove="1" noResize="1" noEditPoints="1" noAdjustHandles="1" noChangeArrowheads="1" noChangeShapeType="1" noTextEdit="1"/>
+          </p:cNvSpPr>
+          <p:nvPr>
+            <p:extLst>
+              <p:ext uri="{386F3935-93C4-4BCD-93E2-E3B085C9AB24}">
+                <p16:designElem xmlns:p16="http://schemas.microsoft.com/office/powerpoint/2015/main" val="1"/>
+              </p:ext>
+            </p:extLst>
+          </p:nvPr>
+        </p:nvSpPr>
+        <p:spPr>
+          <a:xfrm>
+            <a:off x="8042147" y="453643"/>
+            <a:ext cx="3703320" cy="98554"/>
+          </a:xfrm>
+          <a:prstGeom prst="rect">
+            <a:avLst/>
+          </a:prstGeom>
+          <a:solidFill>
+            <a:srgbClr val="969FA7"/>
+          </a:solidFill>
+          <a:ln>
+            <a:noFill/>
+          </a:ln>
+          <a:effectLst/>
+        </p:spPr>
+        <p:style>
+          <a:lnRef idx="1">
+            <a:schemeClr val="accent1"/>
+          </a:lnRef>
+          <a:fillRef idx="3">
+            <a:schemeClr val="accent1"/>
+          </a:fillRef>
+          <a:effectRef idx="2">
+            <a:schemeClr val="accent1"/>
+          </a:effectRef>
+          <a:fontRef idx="minor">
+            <a:schemeClr val="lt1"/>
+          </a:fontRef>
+        </p:style>
+        <p:txBody>
+          <a:bodyPr/>
+          <a:lstStyle/>
+          <a:p>
+            <a:endParaRPr lang="en-US"/>
+          </a:p>
+        </p:txBody>
+      </p:sp>
+      <p:sp>
+        <p:nvSpPr>
+          <p:cNvPr id="27" name="Rectangle 26">
+            <a:extLst>
+              <a:ext uri="{FF2B5EF4-FFF2-40B4-BE49-F238E27FC236}">
+                <a16:creationId xmlns:a16="http://schemas.microsoft.com/office/drawing/2014/main" id="{7B89EEFD-93BC-4ACF-962C-E6279E72B00B}"/>
+              </a:ext>
+              <a:ext uri="{C183D7F6-B498-43B3-948B-1728B52AA6E4}">
+                <adec:decorative xmlns:adec="http://schemas.microsoft.com/office/drawing/2017/decorative" val="1"/>
+              </a:ext>
+            </a:extLst>
+          </p:cNvPr>
+          <p:cNvSpPr>
+            <a:spLocks noGrp="1" noRot="1" noChangeAspect="1" noMove="1" noResize="1" noEditPoints="1" noAdjustHandles="1" noChangeArrowheads="1" noChangeShapeType="1" noTextEdit="1"/>
+          </p:cNvSpPr>
+          <p:nvPr>
+            <p:extLst>
+              <p:ext uri="{386F3935-93C4-4BCD-93E2-E3B085C9AB24}">
+                <p16:designElem xmlns:p16="http://schemas.microsoft.com/office/powerpoint/2015/main" val="1"/>
+              </p:ext>
+            </p:extLst>
+          </p:nvPr>
+        </p:nvSpPr>
+        <p:spPr>
+          <a:xfrm>
+            <a:off x="461436" y="723899"/>
+            <a:ext cx="3703320" cy="5666666"/>
+          </a:xfrm>
+          <a:prstGeom prst="rect">
+            <a:avLst/>
+          </a:prstGeom>
+          <a:solidFill>
+            <a:srgbClr val="465359"/>
+          </a:solidFill>
+          <a:ln>
+            <a:noFill/>
+          </a:ln>
+          <a:effectLst/>
+        </p:spPr>
+        <p:style>
+          <a:lnRef idx="1">
+            <a:schemeClr val="accent1"/>
+          </a:lnRef>
+          <a:fillRef idx="3">
+            <a:schemeClr val="accent1"/>
+          </a:fillRef>
+          <a:effectRef idx="2">
+            <a:schemeClr val="accent1"/>
+          </a:effectRef>
+          <a:fontRef idx="minor">
+            <a:schemeClr val="lt1"/>
+          </a:fontRef>
+        </p:style>
+        <p:txBody>
+          <a:bodyPr/>
+          <a:lstStyle/>
+          <a:p>
+            <a:endParaRPr lang="en-US"/>
+          </a:p>
+        </p:txBody>
+      </p:sp>
+      <p:sp>
+        <p:nvSpPr>
+          <p:cNvPr id="7" name="Title 3">
+            <a:extLst>
+              <a:ext uri="{FF2B5EF4-FFF2-40B4-BE49-F238E27FC236}">
+                <a16:creationId xmlns:a16="http://schemas.microsoft.com/office/drawing/2014/main" id="{AA9E537E-8F1D-CE1E-C433-D916E2A818CB}"/>
+              </a:ext>
+            </a:extLst>
+          </p:cNvPr>
+          <p:cNvSpPr txBox="1">
+            <a:spLocks/>
+          </p:cNvSpPr>
+          <p:nvPr/>
+        </p:nvSpPr>
+        <p:spPr>
+          <a:xfrm>
+            <a:off x="803189" y="1209184"/>
+            <a:ext cx="3089189" cy="4734416"/>
+          </a:xfrm>
+          <a:prstGeom prst="rect">
+            <a:avLst/>
+          </a:prstGeom>
+        </p:spPr>
+        <p:txBody>
+          <a:bodyPr vert="horz" lIns="91440" tIns="45720" rIns="91440" bIns="45720" rtlCol="0" anchor="ctr" anchorCtr="0">
+            <a:normAutofit/>
+          </a:bodyPr>
+          <a:lstStyle>
+            <a:lvl1pPr algn="l" defTabSz="457200" rtl="0" eaLnBrk="1" latinLnBrk="0" hangingPunct="1">
+              <a:lnSpc>
+                <a:spcPct val="100000"/>
+              </a:lnSpc>
+              <a:spcBef>
+                <a:spcPct val="0"/>
+              </a:spcBef>
+              <a:buNone/>
+              <a:defRPr sz="2800" b="0" kern="1200" cap="all">
+                <a:solidFill>
+                  <a:schemeClr val="tx1">
+                    <a:lumMod val="75000"/>
+                    <a:lumOff val="25000"/>
+                  </a:schemeClr>
+                </a:solidFill>
+                <a:latin typeface="+mj-lt"/>
+                <a:ea typeface="+mj-ea"/>
+                <a:cs typeface="+mj-cs"/>
+              </a:defRPr>
+            </a:lvl1pPr>
+            <a:lvl2pPr eaLnBrk="1" hangingPunct="1">
+              <a:defRPr>
+                <a:solidFill>
+                  <a:schemeClr val="tx2"/>
+                </a:solidFill>
+              </a:defRPr>
+            </a:lvl2pPr>
+            <a:lvl3pPr eaLnBrk="1" hangingPunct="1">
+              <a:defRPr>
+                <a:solidFill>
+                  <a:schemeClr val="tx2"/>
+                </a:solidFill>
+              </a:defRPr>
+            </a:lvl3pPr>
+            <a:lvl4pPr eaLnBrk="1" hangingPunct="1">
+              <a:defRPr>
+                <a:solidFill>
+                  <a:schemeClr val="tx2"/>
+                </a:solidFill>
+              </a:defRPr>
+            </a:lvl4pPr>
+            <a:lvl5pPr eaLnBrk="1" hangingPunct="1">
+              <a:defRPr>
+                <a:solidFill>
+                  <a:schemeClr val="tx2"/>
+                </a:solidFill>
+              </a:defRPr>
+            </a:lvl5pPr>
+            <a:lvl6pPr eaLnBrk="1" hangingPunct="1">
+              <a:defRPr>
+                <a:solidFill>
+                  <a:schemeClr val="tx2"/>
+                </a:solidFill>
+              </a:defRPr>
+            </a:lvl6pPr>
+            <a:lvl7pPr eaLnBrk="1" hangingPunct="1">
+              <a:defRPr>
+                <a:solidFill>
+                  <a:schemeClr val="tx2"/>
+                </a:solidFill>
+              </a:defRPr>
+            </a:lvl7pPr>
+            <a:lvl8pPr eaLnBrk="1" hangingPunct="1">
+              <a:defRPr>
+                <a:solidFill>
+                  <a:schemeClr val="tx2"/>
+                </a:solidFill>
+              </a:defRPr>
+            </a:lvl8pPr>
+            <a:lvl9pPr eaLnBrk="1" hangingPunct="1">
+              <a:defRPr>
+                <a:solidFill>
+                  <a:schemeClr val="tx2"/>
+                </a:solidFill>
+              </a:defRPr>
+            </a:lvl9pPr>
+          </a:lstStyle>
+          <a:p>
+            <a:pPr>
+              <a:spcAft>
+                <a:spcPts val="600"/>
+              </a:spcAft>
+            </a:pPr>
+            <a:r>
+              <a:rPr lang="en-US">
+                <a:solidFill>
+                  <a:srgbClr val="FFFFFF"/>
+                </a:solidFill>
+              </a:rPr>
+              <a:t>results</a:t>
+            </a:r>
+          </a:p>
+        </p:txBody>
+      </p:sp>
+      <p:sp>
+        <p:nvSpPr>
+          <p:cNvPr id="6" name="TextBox 5">
+            <a:extLst>
+              <a:ext uri="{FF2B5EF4-FFF2-40B4-BE49-F238E27FC236}">
+                <a16:creationId xmlns:a16="http://schemas.microsoft.com/office/drawing/2014/main" id="{A57CE0FA-5284-2C21-392D-79C5D5E7A8AE}"/>
+              </a:ext>
+            </a:extLst>
+          </p:cNvPr>
+          <p:cNvSpPr txBox="1"/>
+          <p:nvPr/>
+        </p:nvSpPr>
+        <p:spPr>
+          <a:xfrm>
+            <a:off x="4561870" y="723900"/>
+            <a:ext cx="7183597" cy="3152362"/>
+          </a:xfrm>
+          <a:prstGeom prst="rect">
+            <a:avLst/>
+          </a:prstGeom>
+        </p:spPr>
+        <p:txBody>
+          <a:bodyPr vert="horz" lIns="91440" tIns="45720" rIns="91440" bIns="45720" rtlCol="0" anchor="ctr">
+            <a:normAutofit/>
+          </a:bodyPr>
+          <a:lstStyle/>
+          <a:p>
+            <a:pPr defTabSz="457200">
+              <a:spcBef>
+                <a:spcPct val="20000"/>
+              </a:spcBef>
+              <a:spcAft>
+                <a:spcPts val="600"/>
+              </a:spcAft>
+              <a:buClr>
+                <a:schemeClr val="accent1"/>
+              </a:buClr>
+              <a:buSzPct val="92000"/>
+              <a:buFont typeface="Wingdings 2" panose="05020102010507070707" pitchFamily="18" charset="2"/>
+              <a:buChar char=""/>
+            </a:pPr>
+            <a:r>
+              <a:rPr lang="en-US" b="0" i="0">
+                <a:solidFill>
+                  <a:schemeClr val="tx1">
+                    <a:lumMod val="75000"/>
+                    <a:lumOff val="25000"/>
+                  </a:schemeClr>
+                </a:solidFill>
+                <a:effectLst/>
+              </a:rPr>
+              <a:t>We can observe that the accuracy rate is between 50% - 70%. It is desired that high accuracy should on the sequence is required in an anomaly detection program. Due to hardware specification of our machine, we unable to run the program with lots of cycle and sequence. However, accuracy can be improved by running more data sequence and cycle.</a:t>
+            </a:r>
+          </a:p>
+          <a:p>
+            <a:pPr defTabSz="457200">
+              <a:spcBef>
+                <a:spcPct val="20000"/>
+              </a:spcBef>
+              <a:spcAft>
+                <a:spcPts val="600"/>
+              </a:spcAft>
+              <a:buClr>
+                <a:schemeClr val="accent1"/>
+              </a:buClr>
+              <a:buSzPct val="92000"/>
+              <a:buFont typeface="Wingdings 2" panose="05020102010507070707" pitchFamily="18" charset="2"/>
+              <a:buChar char=""/>
+            </a:pPr>
+            <a:r>
+              <a:rPr lang="en-US" b="0" i="0">
+                <a:solidFill>
+                  <a:schemeClr val="tx1">
+                    <a:lumMod val="75000"/>
+                    <a:lumOff val="25000"/>
+                  </a:schemeClr>
+                </a:solidFill>
+                <a:effectLst/>
+              </a:rPr>
+              <a:t>One example of testing sequence for anomaly detection and average accuracy for this sequence given below:</a:t>
+            </a:r>
+          </a:p>
+          <a:p>
+            <a:pPr defTabSz="457200">
+              <a:spcBef>
+                <a:spcPct val="20000"/>
+              </a:spcBef>
+              <a:spcAft>
+                <a:spcPts val="600"/>
+              </a:spcAft>
+              <a:buClr>
+                <a:schemeClr val="accent1"/>
+              </a:buClr>
+              <a:buSzPct val="92000"/>
+              <a:buFont typeface="Wingdings 2" panose="05020102010507070707" pitchFamily="18" charset="2"/>
+              <a:buChar char=""/>
+            </a:pPr>
+            <a:endParaRPr lang="en-US">
+              <a:solidFill>
+                <a:schemeClr val="tx1">
+                  <a:lumMod val="75000"/>
+                  <a:lumOff val="25000"/>
+                </a:schemeClr>
+              </a:solidFill>
+            </a:endParaRPr>
+          </a:p>
+        </p:txBody>
+      </p:sp>
+      <p:pic>
+        <p:nvPicPr>
+          <p:cNvPr id="4" name="Picture 3">
+            <a:extLst>
+              <a:ext uri="{FF2B5EF4-FFF2-40B4-BE49-F238E27FC236}">
+                <a16:creationId xmlns:a16="http://schemas.microsoft.com/office/drawing/2014/main" id="{2665CE9A-DE25-BC57-3FA2-06E32EE9D3FF}"/>
+              </a:ext>
+            </a:extLst>
+          </p:cNvPr>
+          <p:cNvPicPr>
+            <a:picLocks noChangeAspect="1"/>
+          </p:cNvPicPr>
+          <p:nvPr/>
+        </p:nvPicPr>
+        <p:blipFill>
+          <a:blip r:embed="rId2"/>
+          <a:stretch>
+            <a:fillRect/>
+          </a:stretch>
+        </p:blipFill>
+        <p:spPr>
+          <a:xfrm>
+            <a:off x="4771381" y="3501743"/>
+            <a:ext cx="6974086" cy="2196838"/>
+          </a:xfrm>
+          <a:prstGeom prst="rect">
+            <a:avLst/>
+          </a:prstGeom>
+        </p:spPr>
+      </p:pic>
+      <p:sp>
+        <p:nvSpPr>
+          <p:cNvPr id="5" name="Slide Number Placeholder 4">
+            <a:extLst>
+              <a:ext uri="{FF2B5EF4-FFF2-40B4-BE49-F238E27FC236}">
+                <a16:creationId xmlns:a16="http://schemas.microsoft.com/office/drawing/2014/main" id="{2687D6E6-D5FA-4C9E-C76D-CC433D92DBC4}"/>
+              </a:ext>
+            </a:extLst>
+          </p:cNvPr>
+          <p:cNvSpPr>
+            <a:spLocks noGrp="1"/>
+          </p:cNvSpPr>
+          <p:nvPr>
+            <p:ph type="sldNum" sz="quarter" idx="12"/>
+          </p:nvPr>
+        </p:nvSpPr>
+        <p:spPr>
+          <a:xfrm>
+            <a:off x="10558300" y="6400800"/>
+            <a:ext cx="1052508" cy="365125"/>
+          </a:xfrm>
+        </p:spPr>
+        <p:txBody>
+          <a:bodyPr vert="horz" lIns="91440" tIns="45720" rIns="91440" bIns="45720" rtlCol="0" anchor="ctr">
+            <a:normAutofit/>
+          </a:bodyPr>
+          <a:lstStyle/>
+          <a:p>
+            <a:pPr defTabSz="457200">
+              <a:spcAft>
+                <a:spcPts val="600"/>
+              </a:spcAft>
+            </a:pPr>
+            <a:fld id="{3A98EE3D-8CD1-4C3F-BD1C-C98C9596463C}" type="slidenum">
+              <a:rPr lang="en-US" smtClean="0">
+                <a:solidFill>
+                  <a:srgbClr val="F2BB6F"/>
+                </a:solidFill>
+              </a:rPr>
+              <a:pPr defTabSz="457200">
+                <a:spcAft>
+                  <a:spcPts val="600"/>
+                </a:spcAft>
+              </a:pPr>
+              <a:t>17</a:t>
+            </a:fld>
+            <a:endParaRPr lang="en-US">
+              <a:solidFill>
+                <a:srgbClr val="F2BB6F"/>
+              </a:solidFill>
+            </a:endParaRPr>
+          </a:p>
+        </p:txBody>
+      </p:sp>
+    </p:spTree>
+    <p:extLst>
+      <p:ext uri="{BB962C8B-B14F-4D97-AF65-F5344CB8AC3E}">
+        <p14:creationId xmlns:p14="http://schemas.microsoft.com/office/powerpoint/2010/main" val="3566107136"/>
+      </p:ext>
+    </p:extLst>
+  </p:cSld>
+  <p:clrMapOvr>
+    <a:masterClrMapping/>
+  </p:clrMapOvr>
+</p:sld>
+</file>
+
+<file path=ppt/slides/slide18.xml><?xml version="1.0" encoding="utf-8"?>
+<p:sld xmlns:a="http://schemas.openxmlformats.org/drawingml/2006/main" xmlns:r="http://schemas.openxmlformats.org/officeDocument/2006/relationships" xmlns:p="http://schemas.openxmlformats.org/presentationml/2006/main">
+  <p:cSld>
+    <p:bg>
+      <p:bgPr>
+        <a:solidFill>
+          <a:schemeClr val="bg1"/>
+        </a:solidFill>
+        <a:effectLst/>
+      </p:bgPr>
+    </p:bg>
+    <p:spTree>
+      <p:nvGrpSpPr>
+        <p:cNvPr id="1" name=""/>
+        <p:cNvGrpSpPr/>
+        <p:nvPr/>
+      </p:nvGrpSpPr>
+      <p:grpSpPr>
+        <a:xfrm>
+          <a:off x="0" y="0"/>
+          <a:ext cx="0" cy="0"/>
+          <a:chOff x="0" y="0"/>
+          <a:chExt cx="0" cy="0"/>
+        </a:xfrm>
+      </p:grpSpPr>
+      <p:sp useBgFill="1">
+        <p:nvSpPr>
+          <p:cNvPr id="13" name="Rectangle 12">
+            <a:extLst>
+              <a:ext uri="{FF2B5EF4-FFF2-40B4-BE49-F238E27FC236}">
+                <a16:creationId xmlns:a16="http://schemas.microsoft.com/office/drawing/2014/main" id="{F92989FB-1024-49B7-BDF1-B3CE27D48623}"/>
+              </a:ext>
+              <a:ext uri="{C183D7F6-B498-43B3-948B-1728B52AA6E4}">
+                <adec:decorative xmlns:adec="http://schemas.microsoft.com/office/drawing/2017/decorative" val="1"/>
+              </a:ext>
+            </a:extLst>
+          </p:cNvPr>
+          <p:cNvSpPr>
+            <a:spLocks noGrp="1" noRot="1" noChangeAspect="1" noMove="1" noResize="1" noEditPoints="1" noAdjustHandles="1" noChangeArrowheads="1" noChangeShapeType="1" noTextEdit="1"/>
+          </p:cNvSpPr>
+          <p:nvPr>
+            <p:extLst>
+              <p:ext uri="{386F3935-93C4-4BCD-93E2-E3B085C9AB24}">
+                <p16:designElem xmlns:p16="http://schemas.microsoft.com/office/powerpoint/2015/main" val="1"/>
+              </p:ext>
+            </p:extLst>
+          </p:nvPr>
+        </p:nvSpPr>
+        <p:spPr>
+          <a:xfrm>
+            <a:off x="0" y="0"/>
+            <a:ext cx="12191999" cy="6858001"/>
+          </a:xfrm>
+          <a:prstGeom prst="rect">
+            <a:avLst/>
+          </a:prstGeom>
+          <a:ln>
+            <a:noFill/>
+          </a:ln>
+        </p:spPr>
+        <p:style>
+          <a:lnRef idx="2">
+            <a:schemeClr val="accent1">
+              <a:shade val="50000"/>
+            </a:schemeClr>
+          </a:lnRef>
+          <a:fillRef idx="1">
+            <a:schemeClr val="accent1"/>
+          </a:fillRef>
+          <a:effectRef idx="0">
+            <a:schemeClr val="accent1"/>
+          </a:effectRef>
+          <a:fontRef idx="minor">
+            <a:schemeClr val="lt1"/>
+          </a:fontRef>
+        </p:style>
+        <p:txBody>
+          <a:bodyPr rtlCol="0" anchor="ctr"/>
+          <a:lstStyle/>
+          <a:p>
+            <a:pPr algn="ctr"/>
+            <a:endParaRPr lang="en-US"/>
+          </a:p>
+        </p:txBody>
+      </p:sp>
+      <p:sp>
+        <p:nvSpPr>
+          <p:cNvPr id="7" name="Title 3">
+            <a:extLst>
+              <a:ext uri="{FF2B5EF4-FFF2-40B4-BE49-F238E27FC236}">
+                <a16:creationId xmlns:a16="http://schemas.microsoft.com/office/drawing/2014/main" id="{AA9E537E-8F1D-CE1E-C433-D916E2A818CB}"/>
+              </a:ext>
+            </a:extLst>
+          </p:cNvPr>
+          <p:cNvSpPr txBox="1">
+            <a:spLocks/>
+          </p:cNvSpPr>
+          <p:nvPr/>
+        </p:nvSpPr>
+        <p:spPr>
+          <a:xfrm>
+            <a:off x="746228" y="1037967"/>
+            <a:ext cx="3054091" cy="4709131"/>
+          </a:xfrm>
+          <a:prstGeom prst="rect">
+            <a:avLst/>
+          </a:prstGeom>
+        </p:spPr>
+        <p:txBody>
+          <a:bodyPr vert="horz" lIns="91440" tIns="45720" rIns="91440" bIns="45720" rtlCol="0" anchor="ctr" anchorCtr="0">
+            <a:normAutofit/>
+          </a:bodyPr>
+          <a:lstStyle>
+            <a:lvl1pPr algn="l" defTabSz="457200" rtl="0" eaLnBrk="1" latinLnBrk="0" hangingPunct="1">
+              <a:lnSpc>
+                <a:spcPct val="100000"/>
+              </a:lnSpc>
+              <a:spcBef>
+                <a:spcPct val="0"/>
+              </a:spcBef>
+              <a:buNone/>
+              <a:defRPr sz="2800" b="0" kern="1200" cap="all">
+                <a:solidFill>
+                  <a:schemeClr val="tx1">
+                    <a:lumMod val="75000"/>
+                    <a:lumOff val="25000"/>
+                  </a:schemeClr>
+                </a:solidFill>
+                <a:latin typeface="+mj-lt"/>
+                <a:ea typeface="+mj-ea"/>
+                <a:cs typeface="+mj-cs"/>
+              </a:defRPr>
+            </a:lvl1pPr>
+            <a:lvl2pPr eaLnBrk="1" hangingPunct="1">
+              <a:defRPr>
+                <a:solidFill>
+                  <a:schemeClr val="tx2"/>
+                </a:solidFill>
+              </a:defRPr>
+            </a:lvl2pPr>
+            <a:lvl3pPr eaLnBrk="1" hangingPunct="1">
+              <a:defRPr>
+                <a:solidFill>
+                  <a:schemeClr val="tx2"/>
+                </a:solidFill>
+              </a:defRPr>
+            </a:lvl3pPr>
+            <a:lvl4pPr eaLnBrk="1" hangingPunct="1">
+              <a:defRPr>
+                <a:solidFill>
+                  <a:schemeClr val="tx2"/>
+                </a:solidFill>
+              </a:defRPr>
+            </a:lvl4pPr>
+            <a:lvl5pPr eaLnBrk="1" hangingPunct="1">
+              <a:defRPr>
+                <a:solidFill>
+                  <a:schemeClr val="tx2"/>
+                </a:solidFill>
+              </a:defRPr>
+            </a:lvl5pPr>
+            <a:lvl6pPr eaLnBrk="1" hangingPunct="1">
+              <a:defRPr>
+                <a:solidFill>
+                  <a:schemeClr val="tx2"/>
+                </a:solidFill>
+              </a:defRPr>
+            </a:lvl6pPr>
+            <a:lvl7pPr eaLnBrk="1" hangingPunct="1">
+              <a:defRPr>
+                <a:solidFill>
+                  <a:schemeClr val="tx2"/>
+                </a:solidFill>
+              </a:defRPr>
+            </a:lvl7pPr>
+            <a:lvl8pPr eaLnBrk="1" hangingPunct="1">
+              <a:defRPr>
+                <a:solidFill>
+                  <a:schemeClr val="tx2"/>
+                </a:solidFill>
+              </a:defRPr>
+            </a:lvl8pPr>
+            <a:lvl9pPr eaLnBrk="1" hangingPunct="1">
+              <a:defRPr>
+                <a:solidFill>
+                  <a:schemeClr val="tx2"/>
+                </a:solidFill>
+              </a:defRPr>
+            </a:lvl9pPr>
+          </a:lstStyle>
+          <a:p>
+            <a:pPr>
+              <a:spcAft>
+                <a:spcPts val="600"/>
+              </a:spcAft>
+            </a:pPr>
+            <a:r>
+              <a:rPr lang="en-US" b="0" kern="1200" cap="all" dirty="0">
+                <a:solidFill>
+                  <a:schemeClr val="tx1">
+                    <a:lumMod val="75000"/>
+                    <a:lumOff val="25000"/>
+                  </a:schemeClr>
+                </a:solidFill>
+                <a:latin typeface="+mj-lt"/>
+                <a:ea typeface="+mj-ea"/>
+                <a:cs typeface="+mj-cs"/>
+              </a:rPr>
+              <a:t>conclusion</a:t>
+            </a:r>
+          </a:p>
+        </p:txBody>
+      </p:sp>
+      <p:sp>
+        <p:nvSpPr>
+          <p:cNvPr id="15" name="Rectangle 14">
+            <a:extLst>
+              <a:ext uri="{FF2B5EF4-FFF2-40B4-BE49-F238E27FC236}">
+                <a16:creationId xmlns:a16="http://schemas.microsoft.com/office/drawing/2014/main" id="{2987D6F4-EC95-4EF1-A8AD-4B70386CEEC7}"/>
+              </a:ext>
+              <a:ext uri="{C183D7F6-B498-43B3-948B-1728B52AA6E4}">
+                <adec:decorative xmlns:adec="http://schemas.microsoft.com/office/drawing/2017/decorative" val="1"/>
+              </a:ext>
+            </a:extLst>
+          </p:cNvPr>
+          <p:cNvSpPr>
+            <a:spLocks noGrp="1" noRot="1" noChangeAspect="1" noMove="1" noResize="1" noEditPoints="1" noAdjustHandles="1" noChangeArrowheads="1" noChangeShapeType="1" noTextEdit="1"/>
+          </p:cNvSpPr>
+          <p:nvPr>
+            <p:extLst>
+              <p:ext uri="{386F3935-93C4-4BCD-93E2-E3B085C9AB24}">
+                <p16:designElem xmlns:p16="http://schemas.microsoft.com/office/powerpoint/2015/main" val="1"/>
+              </p:ext>
+            </p:extLst>
+          </p:nvPr>
+        </p:nvSpPr>
+        <p:spPr>
+          <a:xfrm>
+            <a:off x="446534" y="457200"/>
+            <a:ext cx="3703320" cy="94997"/>
+          </a:xfrm>
+          <a:prstGeom prst="rect">
+            <a:avLst/>
+          </a:prstGeom>
+          <a:solidFill>
+            <a:srgbClr val="465359"/>
+          </a:solidFill>
+          <a:ln>
+            <a:noFill/>
+          </a:ln>
+          <a:effectLst/>
+        </p:spPr>
+        <p:style>
+          <a:lnRef idx="1">
+            <a:schemeClr val="accent1"/>
+          </a:lnRef>
+          <a:fillRef idx="3">
+            <a:schemeClr val="accent1"/>
+          </a:fillRef>
+          <a:effectRef idx="2">
+            <a:schemeClr val="accent1"/>
+          </a:effectRef>
+          <a:fontRef idx="minor">
+            <a:schemeClr val="lt1"/>
+          </a:fontRef>
+        </p:style>
+        <p:txBody>
+          <a:bodyPr/>
+          <a:lstStyle/>
+          <a:p>
+            <a:endParaRPr lang="en-US"/>
+          </a:p>
+        </p:txBody>
+      </p:sp>
+      <p:sp>
+        <p:nvSpPr>
           <p:cNvPr id="17" name="Rectangle 16">
             <a:extLst>
               <a:ext uri="{FF2B5EF4-FFF2-40B4-BE49-F238E27FC236}">
@@ -11998,7 +14341,7 @@
                   <a:spcPts val="600"/>
                 </a:spcAft>
               </a:pPr>
-              <a:t>10</a:t>
+              <a:t>18</a:t>
             </a:fld>
             <a:endParaRPr lang="en-US"/>
           </a:p>
@@ -12045,7 +14388,7 @@
 </p:sld>
 </file>
 
-<file path=ppt/slides/slide11.xml><?xml version="1.0" encoding="utf-8"?>
+<file path=ppt/slides/slide19.xml><?xml version="1.0" encoding="utf-8"?>
 <p:sld xmlns:a="http://schemas.openxmlformats.org/drawingml/2006/main" xmlns:r="http://schemas.openxmlformats.org/officeDocument/2006/relationships" xmlns:p="http://schemas.openxmlformats.org/presentationml/2006/main">
   <p:cSld>
     <p:bg>
@@ -12922,7 +15265,7 @@
                   <a:spcPts val="600"/>
                 </a:spcAft>
               </a:pPr>
-              <a:t>11</a:t>
+              <a:t>19</a:t>
             </a:fld>
             <a:endParaRPr lang="en-US"/>
           </a:p>
@@ -12941,7 +15284,247 @@
 </p:sld>
 </file>
 
-<file path=ppt/slides/slide12.xml><?xml version="1.0" encoding="utf-8"?>
+<file path=ppt/slides/slide2.xml><?xml version="1.0" encoding="utf-8"?>
+<p:sld xmlns:a="http://schemas.openxmlformats.org/drawingml/2006/main" xmlns:r="http://schemas.openxmlformats.org/officeDocument/2006/relationships" xmlns:p="http://schemas.openxmlformats.org/presentationml/2006/main">
+  <p:cSld>
+    <p:bg>
+      <p:bgPr>
+        <a:solidFill>
+          <a:schemeClr val="bg1"/>
+        </a:solidFill>
+        <a:effectLst/>
+      </p:bgPr>
+    </p:bg>
+    <p:spTree>
+      <p:nvGrpSpPr>
+        <p:cNvPr id="1" name=""/>
+        <p:cNvGrpSpPr/>
+        <p:nvPr/>
+      </p:nvGrpSpPr>
+      <p:grpSpPr>
+        <a:xfrm>
+          <a:off x="0" y="0"/>
+          <a:ext cx="0" cy="0"/>
+          <a:chOff x="0" y="0"/>
+          <a:chExt cx="0" cy="0"/>
+        </a:xfrm>
+      </p:grpSpPr>
+      <p:sp>
+        <p:nvSpPr>
+          <p:cNvPr id="7" name="Title 3">
+            <a:extLst>
+              <a:ext uri="{FF2B5EF4-FFF2-40B4-BE49-F238E27FC236}">
+                <a16:creationId xmlns:a16="http://schemas.microsoft.com/office/drawing/2014/main" id="{AA9E537E-8F1D-CE1E-C433-D916E2A818CB}"/>
+              </a:ext>
+            </a:extLst>
+          </p:cNvPr>
+          <p:cNvSpPr txBox="1">
+            <a:spLocks/>
+          </p:cNvSpPr>
+          <p:nvPr/>
+        </p:nvSpPr>
+        <p:spPr>
+          <a:xfrm>
+            <a:off x="581192" y="702156"/>
+            <a:ext cx="11029616" cy="1188720"/>
+          </a:xfrm>
+          <a:prstGeom prst="rect">
+            <a:avLst/>
+          </a:prstGeom>
+        </p:spPr>
+        <p:txBody>
+          <a:bodyPr vert="horz" lIns="91440" tIns="45720" rIns="91440" bIns="45720" rtlCol="0" anchor="b" anchorCtr="0">
+            <a:normAutofit/>
+          </a:bodyPr>
+          <a:lstStyle>
+            <a:lvl1pPr algn="l" defTabSz="457200" rtl="0" eaLnBrk="1" latinLnBrk="0" hangingPunct="1">
+              <a:lnSpc>
+                <a:spcPct val="100000"/>
+              </a:lnSpc>
+              <a:spcBef>
+                <a:spcPct val="0"/>
+              </a:spcBef>
+              <a:buNone/>
+              <a:defRPr sz="2800" b="0" kern="1200" cap="all">
+                <a:solidFill>
+                  <a:schemeClr val="tx1">
+                    <a:lumMod val="75000"/>
+                    <a:lumOff val="25000"/>
+                  </a:schemeClr>
+                </a:solidFill>
+                <a:latin typeface="+mj-lt"/>
+                <a:ea typeface="+mj-ea"/>
+                <a:cs typeface="+mj-cs"/>
+              </a:defRPr>
+            </a:lvl1pPr>
+            <a:lvl2pPr eaLnBrk="1" hangingPunct="1">
+              <a:defRPr>
+                <a:solidFill>
+                  <a:schemeClr val="tx2"/>
+                </a:solidFill>
+              </a:defRPr>
+            </a:lvl2pPr>
+            <a:lvl3pPr eaLnBrk="1" hangingPunct="1">
+              <a:defRPr>
+                <a:solidFill>
+                  <a:schemeClr val="tx2"/>
+                </a:solidFill>
+              </a:defRPr>
+            </a:lvl3pPr>
+            <a:lvl4pPr eaLnBrk="1" hangingPunct="1">
+              <a:defRPr>
+                <a:solidFill>
+                  <a:schemeClr val="tx2"/>
+                </a:solidFill>
+              </a:defRPr>
+            </a:lvl4pPr>
+            <a:lvl5pPr eaLnBrk="1" hangingPunct="1">
+              <a:defRPr>
+                <a:solidFill>
+                  <a:schemeClr val="tx2"/>
+                </a:solidFill>
+              </a:defRPr>
+            </a:lvl5pPr>
+            <a:lvl6pPr eaLnBrk="1" hangingPunct="1">
+              <a:defRPr>
+                <a:solidFill>
+                  <a:schemeClr val="tx2"/>
+                </a:solidFill>
+              </a:defRPr>
+            </a:lvl6pPr>
+            <a:lvl7pPr eaLnBrk="1" hangingPunct="1">
+              <a:defRPr>
+                <a:solidFill>
+                  <a:schemeClr val="tx2"/>
+                </a:solidFill>
+              </a:defRPr>
+            </a:lvl7pPr>
+            <a:lvl8pPr eaLnBrk="1" hangingPunct="1">
+              <a:defRPr>
+                <a:solidFill>
+                  <a:schemeClr val="tx2"/>
+                </a:solidFill>
+              </a:defRPr>
+            </a:lvl8pPr>
+            <a:lvl9pPr eaLnBrk="1" hangingPunct="1">
+              <a:defRPr>
+                <a:solidFill>
+                  <a:schemeClr val="tx2"/>
+                </a:solidFill>
+              </a:defRPr>
+            </a:lvl9pPr>
+          </a:lstStyle>
+          <a:p>
+            <a:pPr>
+              <a:spcAft>
+                <a:spcPts val="600"/>
+              </a:spcAft>
+            </a:pPr>
+            <a:r>
+              <a:rPr lang="en-US" b="0" kern="1200" cap="all" dirty="0">
+                <a:solidFill>
+                  <a:schemeClr val="tx1">
+                    <a:lumMod val="75000"/>
+                    <a:lumOff val="25000"/>
+                  </a:schemeClr>
+                </a:solidFill>
+                <a:latin typeface="+mj-lt"/>
+                <a:ea typeface="+mj-ea"/>
+                <a:cs typeface="+mj-cs"/>
+              </a:rPr>
+              <a:t>Overview</a:t>
+            </a:r>
+          </a:p>
+        </p:txBody>
+      </p:sp>
+      <p:sp>
+        <p:nvSpPr>
+          <p:cNvPr id="5" name="Slide Number Placeholder 4">
+            <a:extLst>
+              <a:ext uri="{FF2B5EF4-FFF2-40B4-BE49-F238E27FC236}">
+                <a16:creationId xmlns:a16="http://schemas.microsoft.com/office/drawing/2014/main" id="{2687D6E6-D5FA-4C9E-C76D-CC433D92DBC4}"/>
+              </a:ext>
+            </a:extLst>
+          </p:cNvPr>
+          <p:cNvSpPr>
+            <a:spLocks noGrp="1"/>
+          </p:cNvSpPr>
+          <p:nvPr>
+            <p:ph type="sldNum" sz="quarter" idx="12"/>
+          </p:nvPr>
+        </p:nvSpPr>
+        <p:spPr>
+          <a:xfrm>
+            <a:off x="10558300" y="6423914"/>
+            <a:ext cx="1052510" cy="365125"/>
+          </a:xfrm>
+        </p:spPr>
+        <p:txBody>
+          <a:bodyPr vert="horz" lIns="91440" tIns="45720" rIns="91440" bIns="45720" rtlCol="0" anchor="ctr">
+            <a:normAutofit/>
+          </a:bodyPr>
+          <a:lstStyle/>
+          <a:p>
+            <a:pPr defTabSz="457200">
+              <a:spcAft>
+                <a:spcPts val="600"/>
+              </a:spcAft>
+            </a:pPr>
+            <a:fld id="{3A98EE3D-8CD1-4C3F-BD1C-C98C9596463C}" type="slidenum">
+              <a:rPr lang="en-US" smtClean="0"/>
+              <a:pPr defTabSz="457200">
+                <a:spcAft>
+                  <a:spcPts val="600"/>
+                </a:spcAft>
+              </a:pPr>
+              <a:t>2</a:t>
+            </a:fld>
+            <a:endParaRPr lang="en-US"/>
+          </a:p>
+        </p:txBody>
+      </p:sp>
+      <p:graphicFrame>
+        <p:nvGraphicFramePr>
+          <p:cNvPr id="6" name="TextBox 12">
+            <a:extLst>
+              <a:ext uri="{FF2B5EF4-FFF2-40B4-BE49-F238E27FC236}">
+                <a16:creationId xmlns:a16="http://schemas.microsoft.com/office/drawing/2014/main" id="{20A849DE-F2B6-76CA-3767-636DCC681E3F}"/>
+              </a:ext>
+            </a:extLst>
+          </p:cNvPr>
+          <p:cNvGraphicFramePr/>
+          <p:nvPr>
+            <p:extLst>
+              <p:ext uri="{D42A27DB-BD31-4B8C-83A1-F6EECF244321}">
+                <p14:modId xmlns:p14="http://schemas.microsoft.com/office/powerpoint/2010/main" val="2244147138"/>
+              </p:ext>
+            </p:extLst>
+          </p:nvPr>
+        </p:nvGraphicFramePr>
+        <p:xfrm>
+          <a:off x="581025" y="2341563"/>
+          <a:ext cx="11029950" cy="3814281"/>
+        </p:xfrm>
+        <a:graphic>
+          <a:graphicData uri="http://schemas.openxmlformats.org/drawingml/2006/diagram">
+            <dgm:relIds xmlns:dgm="http://schemas.openxmlformats.org/drawingml/2006/diagram" xmlns:r="http://schemas.openxmlformats.org/officeDocument/2006/relationships" r:dm="rId2" r:lo="rId3" r:qs="rId4" r:cs="rId5"/>
+          </a:graphicData>
+        </a:graphic>
+      </p:graphicFrame>
+    </p:spTree>
+    <p:extLst>
+      <p:ext uri="{BB962C8B-B14F-4D97-AF65-F5344CB8AC3E}">
+        <p14:creationId xmlns:p14="http://schemas.microsoft.com/office/powerpoint/2010/main" val="2725059968"/>
+      </p:ext>
+    </p:extLst>
+  </p:cSld>
+  <p:clrMapOvr>
+    <a:masterClrMapping/>
+  </p:clrMapOvr>
+</p:sld>
+</file>
+
+<file path=ppt/slides/slide20.xml><?xml version="1.0" encoding="utf-8"?>
 <p:sld xmlns:a="http://schemas.openxmlformats.org/drawingml/2006/main" xmlns:r="http://schemas.openxmlformats.org/officeDocument/2006/relationships" xmlns:p="http://schemas.openxmlformats.org/presentationml/2006/main">
   <p:cSld>
     <p:bg>
@@ -13707,7 +16290,7 @@
                   <a:spcPts val="600"/>
                 </a:spcAft>
               </a:pPr>
-              <a:t>12</a:t>
+              <a:t>20</a:t>
             </a:fld>
             <a:endParaRPr lang="en-US">
               <a:solidFill>
@@ -13724,246 +16307,6 @@
     <p:extLst>
       <p:ext uri="{BB962C8B-B14F-4D97-AF65-F5344CB8AC3E}">
         <p14:creationId xmlns:p14="http://schemas.microsoft.com/office/powerpoint/2010/main" val="238273095"/>
-      </p:ext>
-    </p:extLst>
-  </p:cSld>
-  <p:clrMapOvr>
-    <a:masterClrMapping/>
-  </p:clrMapOvr>
-</p:sld>
-</file>
-
-<file path=ppt/slides/slide2.xml><?xml version="1.0" encoding="utf-8"?>
-<p:sld xmlns:a="http://schemas.openxmlformats.org/drawingml/2006/main" xmlns:r="http://schemas.openxmlformats.org/officeDocument/2006/relationships" xmlns:p="http://schemas.openxmlformats.org/presentationml/2006/main">
-  <p:cSld>
-    <p:bg>
-      <p:bgPr>
-        <a:solidFill>
-          <a:schemeClr val="bg1"/>
-        </a:solidFill>
-        <a:effectLst/>
-      </p:bgPr>
-    </p:bg>
-    <p:spTree>
-      <p:nvGrpSpPr>
-        <p:cNvPr id="1" name=""/>
-        <p:cNvGrpSpPr/>
-        <p:nvPr/>
-      </p:nvGrpSpPr>
-      <p:grpSpPr>
-        <a:xfrm>
-          <a:off x="0" y="0"/>
-          <a:ext cx="0" cy="0"/>
-          <a:chOff x="0" y="0"/>
-          <a:chExt cx="0" cy="0"/>
-        </a:xfrm>
-      </p:grpSpPr>
-      <p:sp>
-        <p:nvSpPr>
-          <p:cNvPr id="7" name="Title 3">
-            <a:extLst>
-              <a:ext uri="{FF2B5EF4-FFF2-40B4-BE49-F238E27FC236}">
-                <a16:creationId xmlns:a16="http://schemas.microsoft.com/office/drawing/2014/main" id="{AA9E537E-8F1D-CE1E-C433-D916E2A818CB}"/>
-              </a:ext>
-            </a:extLst>
-          </p:cNvPr>
-          <p:cNvSpPr txBox="1">
-            <a:spLocks/>
-          </p:cNvSpPr>
-          <p:nvPr/>
-        </p:nvSpPr>
-        <p:spPr>
-          <a:xfrm>
-            <a:off x="581192" y="702156"/>
-            <a:ext cx="11029616" cy="1188720"/>
-          </a:xfrm>
-          <a:prstGeom prst="rect">
-            <a:avLst/>
-          </a:prstGeom>
-        </p:spPr>
-        <p:txBody>
-          <a:bodyPr vert="horz" lIns="91440" tIns="45720" rIns="91440" bIns="45720" rtlCol="0" anchor="b" anchorCtr="0">
-            <a:normAutofit/>
-          </a:bodyPr>
-          <a:lstStyle>
-            <a:lvl1pPr algn="l" defTabSz="457200" rtl="0" eaLnBrk="1" latinLnBrk="0" hangingPunct="1">
-              <a:lnSpc>
-                <a:spcPct val="100000"/>
-              </a:lnSpc>
-              <a:spcBef>
-                <a:spcPct val="0"/>
-              </a:spcBef>
-              <a:buNone/>
-              <a:defRPr sz="2800" b="0" kern="1200" cap="all">
-                <a:solidFill>
-                  <a:schemeClr val="tx1">
-                    <a:lumMod val="75000"/>
-                    <a:lumOff val="25000"/>
-                  </a:schemeClr>
-                </a:solidFill>
-                <a:latin typeface="+mj-lt"/>
-                <a:ea typeface="+mj-ea"/>
-                <a:cs typeface="+mj-cs"/>
-              </a:defRPr>
-            </a:lvl1pPr>
-            <a:lvl2pPr eaLnBrk="1" hangingPunct="1">
-              <a:defRPr>
-                <a:solidFill>
-                  <a:schemeClr val="tx2"/>
-                </a:solidFill>
-              </a:defRPr>
-            </a:lvl2pPr>
-            <a:lvl3pPr eaLnBrk="1" hangingPunct="1">
-              <a:defRPr>
-                <a:solidFill>
-                  <a:schemeClr val="tx2"/>
-                </a:solidFill>
-              </a:defRPr>
-            </a:lvl3pPr>
-            <a:lvl4pPr eaLnBrk="1" hangingPunct="1">
-              <a:defRPr>
-                <a:solidFill>
-                  <a:schemeClr val="tx2"/>
-                </a:solidFill>
-              </a:defRPr>
-            </a:lvl4pPr>
-            <a:lvl5pPr eaLnBrk="1" hangingPunct="1">
-              <a:defRPr>
-                <a:solidFill>
-                  <a:schemeClr val="tx2"/>
-                </a:solidFill>
-              </a:defRPr>
-            </a:lvl5pPr>
-            <a:lvl6pPr eaLnBrk="1" hangingPunct="1">
-              <a:defRPr>
-                <a:solidFill>
-                  <a:schemeClr val="tx2"/>
-                </a:solidFill>
-              </a:defRPr>
-            </a:lvl6pPr>
-            <a:lvl7pPr eaLnBrk="1" hangingPunct="1">
-              <a:defRPr>
-                <a:solidFill>
-                  <a:schemeClr val="tx2"/>
-                </a:solidFill>
-              </a:defRPr>
-            </a:lvl7pPr>
-            <a:lvl8pPr eaLnBrk="1" hangingPunct="1">
-              <a:defRPr>
-                <a:solidFill>
-                  <a:schemeClr val="tx2"/>
-                </a:solidFill>
-              </a:defRPr>
-            </a:lvl8pPr>
-            <a:lvl9pPr eaLnBrk="1" hangingPunct="1">
-              <a:defRPr>
-                <a:solidFill>
-                  <a:schemeClr val="tx2"/>
-                </a:solidFill>
-              </a:defRPr>
-            </a:lvl9pPr>
-          </a:lstStyle>
-          <a:p>
-            <a:pPr>
-              <a:spcAft>
-                <a:spcPts val="600"/>
-              </a:spcAft>
-            </a:pPr>
-            <a:r>
-              <a:rPr lang="en-US" b="0" kern="1200" cap="all" dirty="0">
-                <a:solidFill>
-                  <a:schemeClr val="tx1">
-                    <a:lumMod val="75000"/>
-                    <a:lumOff val="25000"/>
-                  </a:schemeClr>
-                </a:solidFill>
-                <a:latin typeface="+mj-lt"/>
-                <a:ea typeface="+mj-ea"/>
-                <a:cs typeface="+mj-cs"/>
-              </a:rPr>
-              <a:t>Overview</a:t>
-            </a:r>
-          </a:p>
-        </p:txBody>
-      </p:sp>
-      <p:sp>
-        <p:nvSpPr>
-          <p:cNvPr id="5" name="Slide Number Placeholder 4">
-            <a:extLst>
-              <a:ext uri="{FF2B5EF4-FFF2-40B4-BE49-F238E27FC236}">
-                <a16:creationId xmlns:a16="http://schemas.microsoft.com/office/drawing/2014/main" id="{2687D6E6-D5FA-4C9E-C76D-CC433D92DBC4}"/>
-              </a:ext>
-            </a:extLst>
-          </p:cNvPr>
-          <p:cNvSpPr>
-            <a:spLocks noGrp="1"/>
-          </p:cNvSpPr>
-          <p:nvPr>
-            <p:ph type="sldNum" sz="quarter" idx="12"/>
-          </p:nvPr>
-        </p:nvSpPr>
-        <p:spPr>
-          <a:xfrm>
-            <a:off x="10558300" y="6423914"/>
-            <a:ext cx="1052510" cy="365125"/>
-          </a:xfrm>
-        </p:spPr>
-        <p:txBody>
-          <a:bodyPr vert="horz" lIns="91440" tIns="45720" rIns="91440" bIns="45720" rtlCol="0" anchor="ctr">
-            <a:normAutofit/>
-          </a:bodyPr>
-          <a:lstStyle/>
-          <a:p>
-            <a:pPr defTabSz="457200">
-              <a:spcAft>
-                <a:spcPts val="600"/>
-              </a:spcAft>
-            </a:pPr>
-            <a:fld id="{3A98EE3D-8CD1-4C3F-BD1C-C98C9596463C}" type="slidenum">
-              <a:rPr lang="en-US" smtClean="0"/>
-              <a:pPr defTabSz="457200">
-                <a:spcAft>
-                  <a:spcPts val="600"/>
-                </a:spcAft>
-              </a:pPr>
-              <a:t>2</a:t>
-            </a:fld>
-            <a:endParaRPr lang="en-US"/>
-          </a:p>
-        </p:txBody>
-      </p:sp>
-      <p:graphicFrame>
-        <p:nvGraphicFramePr>
-          <p:cNvPr id="6" name="TextBox 12">
-            <a:extLst>
-              <a:ext uri="{FF2B5EF4-FFF2-40B4-BE49-F238E27FC236}">
-                <a16:creationId xmlns:a16="http://schemas.microsoft.com/office/drawing/2014/main" id="{20A849DE-F2B6-76CA-3767-636DCC681E3F}"/>
-              </a:ext>
-            </a:extLst>
-          </p:cNvPr>
-          <p:cNvGraphicFramePr/>
-          <p:nvPr>
-            <p:extLst>
-              <p:ext uri="{D42A27DB-BD31-4B8C-83A1-F6EECF244321}">
-                <p14:modId xmlns:p14="http://schemas.microsoft.com/office/powerpoint/2010/main" val="2244147138"/>
-              </p:ext>
-            </p:extLst>
-          </p:nvPr>
-        </p:nvGraphicFramePr>
-        <p:xfrm>
-          <a:off x="581025" y="2341563"/>
-          <a:ext cx="11029950" cy="3814281"/>
-        </p:xfrm>
-        <a:graphic>
-          <a:graphicData uri="http://schemas.openxmlformats.org/drawingml/2006/diagram">
-            <dgm:relIds xmlns:dgm="http://schemas.openxmlformats.org/drawingml/2006/diagram" xmlns:r="http://schemas.openxmlformats.org/officeDocument/2006/relationships" r:dm="rId2" r:lo="rId3" r:qs="rId4" r:cs="rId5"/>
-          </a:graphicData>
-        </a:graphic>
-      </p:graphicFrame>
-    </p:spTree>
-    <p:extLst>
-      <p:ext uri="{BB962C8B-B14F-4D97-AF65-F5344CB8AC3E}">
-        <p14:creationId xmlns:p14="http://schemas.microsoft.com/office/powerpoint/2010/main" val="2725059968"/>
       </p:ext>
     </p:extLst>
   </p:cSld>
@@ -15700,7 +18043,7 @@
         </p:nvSpPr>
         <p:spPr>
           <a:xfrm>
-            <a:off x="581193" y="2340864"/>
+            <a:off x="581192" y="1886077"/>
             <a:ext cx="10679642" cy="3634486"/>
           </a:xfrm>
           <a:prstGeom prst="rect">
@@ -15729,7 +18072,7 @@
               <a:buSzPct val="92000"/>
             </a:pPr>
             <a:r>
-              <a:rPr lang="en-US" sz="1500" dirty="0">
+              <a:rPr lang="en-US" sz="1500">
                 <a:solidFill>
                   <a:schemeClr val="tx1">
                     <a:lumMod val="75000"/>
@@ -15737,51 +18080,7 @@
                   </a:schemeClr>
                 </a:solidFill>
               </a:rPr>
-              <a:t>We are going to use </a:t>
-            </a:r>
-            <a:r>
-              <a:rPr lang="en-US" sz="1500" dirty="0" err="1">
-                <a:solidFill>
-                  <a:schemeClr val="tx1">
-                    <a:lumMod val="75000"/>
-                    <a:lumOff val="25000"/>
-                  </a:schemeClr>
-                </a:solidFill>
-              </a:rPr>
-              <a:t>multisequencelearning</a:t>
-            </a:r>
-            <a:r>
-              <a:rPr lang="en-US" sz="1500" dirty="0">
-                <a:solidFill>
-                  <a:schemeClr val="tx1">
-                    <a:lumMod val="75000"/>
-                    <a:lumOff val="25000"/>
-                  </a:schemeClr>
-                </a:solidFill>
-              </a:rPr>
-              <a:t> class of </a:t>
-            </a:r>
-            <a:r>
-              <a:rPr lang="en-US" sz="1500" dirty="0" err="1">
-                <a:solidFill>
-                  <a:schemeClr val="tx1">
-                    <a:lumMod val="75000"/>
-                    <a:lumOff val="25000"/>
-                  </a:schemeClr>
-                </a:solidFill>
-              </a:rPr>
-              <a:t>NeoCortex</a:t>
-            </a:r>
-            <a:r>
-              <a:rPr lang="en-US" sz="1500" dirty="0">
-                <a:solidFill>
-                  <a:schemeClr val="tx1">
-                    <a:lumMod val="75000"/>
-                    <a:lumOff val="25000"/>
-                  </a:schemeClr>
-                </a:solidFill>
-              </a:rPr>
-              <a:t> API as base of our project. It will help use with both training our HTM model and using it for prediction. The class works in the following way: </a:t>
+              <a:t>We are going to use multisequencelearning class of NeoCortex API as base of our project. It will help use with both training our HTM model and using it for prediction. The class works in the following way: </a:t>
             </a:r>
           </a:p>
           <a:p>
@@ -15802,7 +18101,7 @@
               <a:buFont typeface="Wingdings 2" panose="05020102010507070707" pitchFamily="18" charset="2"/>
               <a:buChar char=""/>
             </a:pPr>
-            <a:endParaRPr lang="en-US" sz="1500" dirty="0">
+            <a:endParaRPr lang="en-US" sz="1500">
               <a:solidFill>
                 <a:schemeClr val="tx1">
                   <a:lumMod val="75000"/>
@@ -15830,7 +18129,7 @@
               <a:buChar char=""/>
             </a:pPr>
             <a:r>
-              <a:rPr lang="en-US" sz="1500" dirty="0">
+              <a:rPr lang="en-US" sz="1500">
                 <a:solidFill>
                   <a:schemeClr val="tx1">
                     <a:lumMod val="75000"/>
@@ -15838,29 +18137,7 @@
                   </a:schemeClr>
                 </a:solidFill>
               </a:rPr>
-              <a:t>HTM Configuration is taken and memory of connections are initialized. After that, HTM Classifier, Cortex layer and </a:t>
-            </a:r>
-            <a:r>
-              <a:rPr lang="en-US" sz="1500" dirty="0" err="1">
-                <a:solidFill>
-                  <a:schemeClr val="tx1">
-                    <a:lumMod val="75000"/>
-                    <a:lumOff val="25000"/>
-                  </a:schemeClr>
-                </a:solidFill>
-              </a:rPr>
-              <a:t>HomeostaticPlasticityController</a:t>
-            </a:r>
-            <a:r>
-              <a:rPr lang="en-US" sz="1500" dirty="0">
-                <a:solidFill>
-                  <a:schemeClr val="tx1">
-                    <a:lumMod val="75000"/>
-                    <a:lumOff val="25000"/>
-                  </a:schemeClr>
-                </a:solidFill>
-              </a:rPr>
-              <a:t> are initialized. </a:t>
+              <a:t>HTM Configuration is taken and memory of connections are initialized. After that, HTM Classifier, Cortex layer and HomeostaticPlasticityController are initialized. </a:t>
             </a:r>
           </a:p>
           <a:p>
@@ -15889,150 +18166,6 @@
                 </a:schemeClr>
               </a:solidFill>
             </a:endParaRPr>
-          </a:p>
-          <a:p>
-            <a:pPr marL="285750" indent="-285750" defTabSz="457200">
-              <a:lnSpc>
-                <a:spcPct val="90000"/>
-              </a:lnSpc>
-              <a:spcBef>
-                <a:spcPct val="20000"/>
-              </a:spcBef>
-              <a:spcAft>
-                <a:spcPts val="600"/>
-              </a:spcAft>
-              <a:buClr>
-                <a:schemeClr val="accent1"/>
-              </a:buClr>
-              <a:buSzPct val="92000"/>
-              <a:buFont typeface="Wingdings 2" panose="05020102010507070707" pitchFamily="18" charset="2"/>
-              <a:buChar char=""/>
-            </a:pPr>
-            <a:r>
-              <a:rPr lang="en-US" sz="1500" dirty="0">
-                <a:solidFill>
-                  <a:schemeClr val="tx1">
-                    <a:lumMod val="75000"/>
-                    <a:lumOff val="25000"/>
-                  </a:schemeClr>
-                </a:solidFill>
-              </a:rPr>
-              <a:t>After that, Spatial Pooler and Temporal Memory is initialized.</a:t>
-            </a:r>
-          </a:p>
-          <a:p>
-            <a:pPr marL="285750" indent="-285750" defTabSz="457200">
-              <a:lnSpc>
-                <a:spcPct val="90000"/>
-              </a:lnSpc>
-              <a:spcBef>
-                <a:spcPct val="20000"/>
-              </a:spcBef>
-              <a:spcAft>
-                <a:spcPts val="600"/>
-              </a:spcAft>
-              <a:buClr>
-                <a:schemeClr val="accent1"/>
-              </a:buClr>
-              <a:buSzPct val="92000"/>
-              <a:buFont typeface="Wingdings 2" panose="05020102010507070707" pitchFamily="18" charset="2"/>
-              <a:buChar char=""/>
-            </a:pPr>
-            <a:endParaRPr lang="en-US" sz="1500" dirty="0">
-              <a:solidFill>
-                <a:schemeClr val="tx1">
-                  <a:lumMod val="75000"/>
-                  <a:lumOff val="25000"/>
-                </a:schemeClr>
-              </a:solidFill>
-            </a:endParaRPr>
-          </a:p>
-          <a:p>
-            <a:pPr marL="285750" indent="-285750" defTabSz="457200">
-              <a:lnSpc>
-                <a:spcPct val="90000"/>
-              </a:lnSpc>
-              <a:spcBef>
-                <a:spcPct val="20000"/>
-              </a:spcBef>
-              <a:spcAft>
-                <a:spcPts val="600"/>
-              </a:spcAft>
-              <a:buClr>
-                <a:schemeClr val="accent1"/>
-              </a:buClr>
-              <a:buSzPct val="92000"/>
-              <a:buFont typeface="Wingdings 2" panose="05020102010507070707" pitchFamily="18" charset="2"/>
-              <a:buChar char=""/>
-            </a:pPr>
-            <a:r>
-              <a:rPr lang="en-US" sz="1500" dirty="0">
-                <a:solidFill>
-                  <a:schemeClr val="tx1">
-                    <a:lumMod val="75000"/>
-                    <a:lumOff val="25000"/>
-                  </a:schemeClr>
-                </a:solidFill>
-              </a:rPr>
-              <a:t>After that, spatial pooler memory is added to cortex layer and trained for maximum number of cycles.</a:t>
-            </a:r>
-          </a:p>
-          <a:p>
-            <a:pPr marL="285750" indent="-285750" defTabSz="457200">
-              <a:lnSpc>
-                <a:spcPct val="90000"/>
-              </a:lnSpc>
-              <a:spcBef>
-                <a:spcPct val="20000"/>
-              </a:spcBef>
-              <a:spcAft>
-                <a:spcPts val="600"/>
-              </a:spcAft>
-              <a:buClr>
-                <a:schemeClr val="accent1"/>
-              </a:buClr>
-              <a:buSzPct val="92000"/>
-              <a:buFont typeface="Wingdings 2" panose="05020102010507070707" pitchFamily="18" charset="2"/>
-              <a:buChar char=""/>
-            </a:pPr>
-            <a:endParaRPr lang="en-US" sz="1500" dirty="0">
-              <a:solidFill>
-                <a:schemeClr val="tx1">
-                  <a:lumMod val="75000"/>
-                  <a:lumOff val="25000"/>
-                </a:schemeClr>
-              </a:solidFill>
-            </a:endParaRPr>
-          </a:p>
-          <a:p>
-            <a:pPr marL="285750" indent="-285750" defTabSz="457200">
-              <a:lnSpc>
-                <a:spcPct val="90000"/>
-              </a:lnSpc>
-              <a:spcBef>
-                <a:spcPct val="20000"/>
-              </a:spcBef>
-              <a:spcAft>
-                <a:spcPts val="600"/>
-              </a:spcAft>
-              <a:buClr>
-                <a:schemeClr val="accent1"/>
-              </a:buClr>
-              <a:buSzPct val="92000"/>
-              <a:buFont typeface="Wingdings 2" panose="05020102010507070707" pitchFamily="18" charset="2"/>
-              <a:buChar char=""/>
-            </a:pPr>
-            <a:r>
-              <a:rPr lang="en-US" sz="1500" dirty="0">
-                <a:solidFill>
-                  <a:schemeClr val="tx1">
-                    <a:lumMod val="75000"/>
-                    <a:lumOff val="25000"/>
-                  </a:schemeClr>
-                </a:solidFill>
-              </a:rPr>
-              <a:t>After that, temporal memory is added to cortex layer to learn all the input sequences. e. Finally, the trained cortex layer and HTM classifier is returned. </a:t>
-            </a:r>
           </a:p>
         </p:txBody>
       </p:sp>
@@ -16232,7 +18365,7 @@
               </a:spcAft>
             </a:pPr>
             <a:r>
-              <a:rPr lang="en-US" b="0" kern="1200" cap="all" dirty="0">
+              <a:rPr lang="en-US" b="0" kern="1200" cap="all">
                 <a:solidFill>
                   <a:schemeClr val="tx1">
                     <a:lumMod val="75000"/>
@@ -16245,6 +18378,17 @@
               </a:rPr>
               <a:t>Methodology (Cont.)</a:t>
             </a:r>
+            <a:endParaRPr lang="en-US" b="0" kern="1200" cap="all" dirty="0">
+              <a:solidFill>
+                <a:schemeClr val="tx1">
+                  <a:lumMod val="75000"/>
+                  <a:lumOff val="25000"/>
+                </a:schemeClr>
+              </a:solidFill>
+              <a:latin typeface="+mj-lt"/>
+              <a:ea typeface="+mj-ea"/>
+              <a:cs typeface="+mj-cs"/>
+            </a:endParaRPr>
           </a:p>
         </p:txBody>
       </p:sp>
@@ -16281,7 +18425,7 @@
               </a:spcAft>
             </a:pPr>
             <a:fld id="{3A98EE3D-8CD1-4C3F-BD1C-C98C9596463C}" type="slidenum">
-              <a:rPr lang="en-US" sz="1260" kern="1200">
+              <a:rPr lang="en-US" sz="1260" kern="1200" smtClean="0">
                 <a:solidFill>
                   <a:schemeClr val="tx1"/>
                 </a:solidFill>
@@ -16317,8 +18461,8 @@
         </p:nvSpPr>
         <p:spPr>
           <a:xfrm>
-            <a:off x="2053004" y="2341563"/>
-            <a:ext cx="4298994" cy="286232"/>
+            <a:off x="1043354" y="2341563"/>
+            <a:ext cx="5308644" cy="286232"/>
           </a:xfrm>
           <a:prstGeom prst="rect">
             <a:avLst/>
@@ -16387,8 +18531,8 @@
         </p:nvSpPr>
         <p:spPr>
           <a:xfrm>
-            <a:off x="2135677" y="2918044"/>
-            <a:ext cx="4298994" cy="2533001"/>
+            <a:off x="867508" y="2918044"/>
+            <a:ext cx="6295292" cy="1951303"/>
           </a:xfrm>
           <a:prstGeom prst="rect">
             <a:avLst/>
@@ -16767,7 +18911,7 @@
         <p:spPr>
           <a:xfrm>
             <a:off x="961292" y="2274838"/>
-            <a:ext cx="6096000" cy="2308324"/>
+            <a:ext cx="9015046" cy="1754326"/>
           </a:xfrm>
           <a:prstGeom prst="rect">
             <a:avLst/>
@@ -17100,9 +19244,10 @@
               </a:lnSpc>
             </a:pPr>
             <a:r>
-              <a:rPr lang="en-US" dirty="0"/>
+              <a:rPr lang="en-US"/>
               <a:t>Methodology (Cont.)</a:t>
             </a:r>
+            <a:endParaRPr lang="en-US" dirty="0"/>
           </a:p>
         </p:txBody>
       </p:sp>
@@ -17120,8 +19265,8 @@
         </p:nvSpPr>
         <p:spPr>
           <a:xfrm>
-            <a:off x="738554" y="1403811"/>
-            <a:ext cx="6096000" cy="369332"/>
+            <a:off x="445477" y="1403811"/>
+            <a:ext cx="6389077" cy="369332"/>
           </a:xfrm>
           <a:prstGeom prst="rect">
             <a:avLst/>
@@ -17156,8 +19301,8 @@
         </p:nvSpPr>
         <p:spPr>
           <a:xfrm>
-            <a:off x="355052" y="2352544"/>
-            <a:ext cx="6096000" cy="1754326"/>
+            <a:off x="355051" y="2352544"/>
+            <a:ext cx="9972979" cy="923330"/>
           </a:xfrm>
           <a:prstGeom prst="rect">
             <a:avLst/>
@@ -17242,36 +19387,6 @@
           </a:p>
         </p:txBody>
       </p:sp>
-      <p:pic>
-        <p:nvPicPr>
-          <p:cNvPr id="10" name="Picture 9">
-            <a:extLst>
-              <a:ext uri="{FF2B5EF4-FFF2-40B4-BE49-F238E27FC236}">
-                <a16:creationId xmlns:a16="http://schemas.microsoft.com/office/drawing/2014/main" id="{0B57976D-5C24-4CAE-9648-CB3AE72884AB}"/>
-              </a:ext>
-            </a:extLst>
-          </p:cNvPr>
-          <p:cNvPicPr>
-            <a:picLocks noChangeAspect="1"/>
-          </p:cNvPicPr>
-          <p:nvPr/>
-        </p:nvPicPr>
-        <p:blipFill>
-          <a:blip r:embed="rId2"/>
-          <a:stretch>
-            <a:fillRect/>
-          </a:stretch>
-        </p:blipFill>
-        <p:spPr>
-          <a:xfrm>
-            <a:off x="6788427" y="2186609"/>
-            <a:ext cx="4591878" cy="2814897"/>
-          </a:xfrm>
-          <a:prstGeom prst="rect">
-            <a:avLst/>
-          </a:prstGeom>
-        </p:spPr>
-      </p:pic>
     </p:spTree>
     <p:extLst>
       <p:ext uri="{BB962C8B-B14F-4D97-AF65-F5344CB8AC3E}">
@@ -17288,14 +19403,6 @@
 <file path=ppt/slides/slide9.xml><?xml version="1.0" encoding="utf-8"?>
 <p:sld xmlns:a="http://schemas.openxmlformats.org/drawingml/2006/main" xmlns:r="http://schemas.openxmlformats.org/officeDocument/2006/relationships" xmlns:p="http://schemas.openxmlformats.org/presentationml/2006/main">
   <p:cSld>
-    <p:bg>
-      <p:bgPr>
-        <a:solidFill>
-          <a:schemeClr val="bg1"/>
-        </a:solidFill>
-        <a:effectLst/>
-      </p:bgPr>
-    </p:bg>
     <p:spTree>
       <p:nvGrpSpPr>
         <p:cNvPr id="1" name=""/>
@@ -17310,546 +19417,186 @@
           <a:chExt cx="0" cy="0"/>
         </a:xfrm>
       </p:grpSpPr>
-      <p:sp useBgFill="1">
+      <p:sp>
         <p:nvSpPr>
-          <p:cNvPr id="19" name="Rectangle 18">
+          <p:cNvPr id="2" name="Title 1">
             <a:extLst>
               <a:ext uri="{FF2B5EF4-FFF2-40B4-BE49-F238E27FC236}">
-                <a16:creationId xmlns:a16="http://schemas.microsoft.com/office/drawing/2014/main" id="{F875149D-F692-45DA-8324-D5E0193D5FC4}"/>
-              </a:ext>
-              <a:ext uri="{C183D7F6-B498-43B3-948B-1728B52AA6E4}">
-                <adec:decorative xmlns:adec="http://schemas.microsoft.com/office/drawing/2017/decorative" val="1"/>
+                <a16:creationId xmlns:a16="http://schemas.microsoft.com/office/drawing/2014/main" id="{0A9AAD05-9A8B-C30B-B4D9-99E3A92A99B5}"/>
               </a:ext>
             </a:extLst>
           </p:cNvPr>
           <p:cNvSpPr>
-            <a:spLocks noGrp="1" noRot="1" noChangeAspect="1" noMove="1" noResize="1" noEditPoints="1" noAdjustHandles="1" noChangeArrowheads="1" noChangeShapeType="1" noTextEdit="1"/>
+            <a:spLocks noGrp="1"/>
           </p:cNvSpPr>
           <p:nvPr>
-            <p:extLst>
-              <p:ext uri="{386F3935-93C4-4BCD-93E2-E3B085C9AB24}">
-                <p16:designElem xmlns:p16="http://schemas.microsoft.com/office/powerpoint/2015/main" val="1"/>
-              </p:ext>
-            </p:extLst>
+            <p:ph type="title"/>
           </p:nvPr>
         </p:nvSpPr>
         <p:spPr>
           <a:xfrm>
-            <a:off x="0" y="0"/>
-            <a:ext cx="12191999" cy="6858001"/>
+            <a:off x="674976" y="702156"/>
+            <a:ext cx="10935832" cy="630482"/>
           </a:xfrm>
-          <a:prstGeom prst="rect">
-            <a:avLst/>
-          </a:prstGeom>
-          <a:ln>
-            <a:noFill/>
-          </a:ln>
         </p:spPr>
-        <p:style>
-          <a:lnRef idx="2">
-            <a:schemeClr val="accent1">
-              <a:shade val="50000"/>
-            </a:schemeClr>
-          </a:lnRef>
-          <a:fillRef idx="1">
-            <a:schemeClr val="accent1"/>
-          </a:fillRef>
-          <a:effectRef idx="0">
-            <a:schemeClr val="accent1"/>
-          </a:effectRef>
-          <a:fontRef idx="minor">
-            <a:schemeClr val="lt1"/>
-          </a:fontRef>
-        </p:style>
         <p:txBody>
-          <a:bodyPr rtlCol="0" anchor="ctr"/>
+          <a:bodyPr/>
           <a:lstStyle/>
           <a:p>
-            <a:pPr algn="ctr"/>
-            <a:endParaRPr lang="en-US"/>
+            <a:r>
+              <a:rPr lang="en-US" dirty="0"/>
+              <a:t>Execution of Project</a:t>
+            </a:r>
           </a:p>
         </p:txBody>
       </p:sp>
       <p:sp>
         <p:nvSpPr>
-          <p:cNvPr id="21" name="Rectangle 20">
+          <p:cNvPr id="3" name="Content Placeholder 2">
             <a:extLst>
               <a:ext uri="{FF2B5EF4-FFF2-40B4-BE49-F238E27FC236}">
-                <a16:creationId xmlns:a16="http://schemas.microsoft.com/office/drawing/2014/main" id="{C0B19935-C760-4698-9DD1-973C8A428D26}"/>
-              </a:ext>
-              <a:ext uri="{C183D7F6-B498-43B3-948B-1728B52AA6E4}">
-                <adec:decorative xmlns:adec="http://schemas.microsoft.com/office/drawing/2017/decorative" val="1"/>
+                <a16:creationId xmlns:a16="http://schemas.microsoft.com/office/drawing/2014/main" id="{7A29D8BD-886F-3049-F4A7-87F6F95E216B}"/>
               </a:ext>
             </a:extLst>
           </p:cNvPr>
           <p:cNvSpPr>
-            <a:spLocks noGrp="1" noRot="1" noChangeAspect="1" noMove="1" noResize="1" noEditPoints="1" noAdjustHandles="1" noChangeArrowheads="1" noChangeShapeType="1" noTextEdit="1"/>
+            <a:spLocks noGrp="1"/>
           </p:cNvSpPr>
           <p:nvPr>
-            <p:extLst>
-              <p:ext uri="{386F3935-93C4-4BCD-93E2-E3B085C9AB24}">
-                <p16:designElem xmlns:p16="http://schemas.microsoft.com/office/powerpoint/2015/main" val="1"/>
-              </p:ext>
-            </p:extLst>
+            <p:ph idx="1"/>
           </p:nvPr>
         </p:nvSpPr>
         <p:spPr>
           <a:xfrm>
-            <a:off x="446534" y="457200"/>
-            <a:ext cx="3703320" cy="94997"/>
+            <a:off x="674975" y="1852985"/>
+            <a:ext cx="11029615" cy="3634486"/>
           </a:xfrm>
-          <a:prstGeom prst="rect">
-            <a:avLst/>
-          </a:prstGeom>
-          <a:solidFill>
-            <a:srgbClr val="465359"/>
-          </a:solidFill>
-          <a:ln>
-            <a:noFill/>
-          </a:ln>
-          <a:effectLst/>
         </p:spPr>
-        <p:style>
-          <a:lnRef idx="1">
-            <a:schemeClr val="accent1"/>
-          </a:lnRef>
-          <a:fillRef idx="3">
-            <a:schemeClr val="accent1"/>
-          </a:fillRef>
-          <a:effectRef idx="2">
-            <a:schemeClr val="accent1"/>
-          </a:effectRef>
-          <a:fontRef idx="minor">
-            <a:schemeClr val="lt1"/>
-          </a:fontRef>
-        </p:style>
         <p:txBody>
-          <a:bodyPr/>
+          <a:bodyPr>
+            <a:normAutofit/>
+          </a:bodyPr>
           <a:lstStyle/>
           <a:p>
+            <a:pPr marL="0" indent="0">
+              <a:buNone/>
+            </a:pPr>
+            <a:r>
+              <a:rPr lang="en-US" b="0" i="0">
+                <a:solidFill>
+                  <a:srgbClr val="1F2328"/>
+                </a:solidFill>
+                <a:effectLst/>
+                <a:latin typeface="-apple-system"/>
+              </a:rPr>
+              <a:t>Firstly, we will read and train the HTM Engine using the data from both our training (learning) and predicting (predictive) folders, which are present as numerical sequences in CSV files in the 'training' and 'predicting' folders inside the project directory. Normally, the values stay within the range of 65 to 75.</a:t>
+            </a:r>
+          </a:p>
+          <a:p>
+            <a:pPr marL="0" indent="0">
+              <a:buNone/>
+            </a:pPr>
             <a:endParaRPr lang="en-US"/>
+          </a:p>
+          <a:p>
+            <a:pPr marL="0" indent="0">
+              <a:buNone/>
+            </a:pPr>
+            <a:endParaRPr lang="en-US"/>
+          </a:p>
+          <a:p>
+            <a:pPr marL="0" indent="0">
+              <a:buNone/>
+            </a:pPr>
+            <a:endParaRPr lang="en-US"/>
+          </a:p>
+          <a:p>
+            <a:pPr marL="0" indent="0">
+              <a:buNone/>
+            </a:pPr>
+            <a:endParaRPr lang="en-US"/>
+          </a:p>
+          <a:p>
+            <a:pPr marL="0" indent="0">
+              <a:buNone/>
+            </a:pPr>
+            <a:r>
+              <a:rPr lang="en-US" b="0" i="0">
+                <a:solidFill>
+                  <a:srgbClr val="1F2328"/>
+                </a:solidFill>
+                <a:effectLst/>
+                <a:latin typeface="-apple-system"/>
+              </a:rPr>
+              <a:t>All values outside of this range are considered anomalies for testing purposes. However, in order to identify anomalies, we have a csv file in the predicting folder. Typically, some of the data in this file does not fall within 65 and 75.</a:t>
+            </a:r>
+          </a:p>
+          <a:p>
+            <a:pPr marL="0" indent="0">
+              <a:buNone/>
+            </a:pPr>
+            <a:endParaRPr lang="en-US" b="0" i="0">
+              <a:solidFill>
+                <a:srgbClr val="1F2328"/>
+              </a:solidFill>
+              <a:effectLst/>
+              <a:latin typeface="-apple-system"/>
+            </a:endParaRPr>
+          </a:p>
+          <a:p>
+            <a:pPr marL="0" indent="0">
+              <a:buNone/>
+            </a:pPr>
+            <a:endParaRPr lang="en-US">
+              <a:solidFill>
+                <a:srgbClr val="1F2328"/>
+              </a:solidFill>
+              <a:latin typeface="-apple-system"/>
+            </a:endParaRPr>
+          </a:p>
+          <a:p>
+            <a:pPr marL="0" indent="0">
+              <a:buNone/>
+            </a:pPr>
+            <a:endParaRPr lang="en-US" dirty="0"/>
           </a:p>
         </p:txBody>
       </p:sp>
       <p:sp>
         <p:nvSpPr>
-          <p:cNvPr id="23" name="Rectangle 22">
+          <p:cNvPr id="5" name="Slide Number Placeholder 4">
             <a:extLst>
               <a:ext uri="{FF2B5EF4-FFF2-40B4-BE49-F238E27FC236}">
-                <a16:creationId xmlns:a16="http://schemas.microsoft.com/office/drawing/2014/main" id="{08990612-E008-4F02-AEBB-B140BE753558}"/>
-              </a:ext>
-              <a:ext uri="{C183D7F6-B498-43B3-948B-1728B52AA6E4}">
-                <adec:decorative xmlns:adec="http://schemas.microsoft.com/office/drawing/2017/decorative" val="1"/>
+                <a16:creationId xmlns:a16="http://schemas.microsoft.com/office/drawing/2014/main" id="{57203070-D601-457B-9DF7-A4611183F29A}"/>
               </a:ext>
             </a:extLst>
           </p:cNvPr>
           <p:cNvSpPr>
-            <a:spLocks noGrp="1" noRot="1" noChangeAspect="1" noMove="1" noResize="1" noEditPoints="1" noAdjustHandles="1" noChangeArrowheads="1" noChangeShapeType="1" noTextEdit="1"/>
+            <a:spLocks noGrp="1"/>
           </p:cNvSpPr>
           <p:nvPr>
-            <p:extLst>
-              <p:ext uri="{386F3935-93C4-4BCD-93E2-E3B085C9AB24}">
-                <p16:designElem xmlns:p16="http://schemas.microsoft.com/office/powerpoint/2015/main" val="1"/>
-              </p:ext>
-            </p:extLst>
+            <p:ph type="sldNum" sz="quarter" idx="12"/>
           </p:nvPr>
         </p:nvSpPr>
-        <p:spPr>
-          <a:xfrm>
-            <a:off x="4241830" y="457200"/>
-            <a:ext cx="3703320" cy="91440"/>
-          </a:xfrm>
-          <a:prstGeom prst="rect">
-            <a:avLst/>
-          </a:prstGeom>
-          <a:solidFill>
-            <a:schemeClr val="accent1"/>
-          </a:solidFill>
-          <a:ln>
-            <a:noFill/>
-          </a:ln>
-          <a:effectLst/>
-        </p:spPr>
-        <p:style>
-          <a:lnRef idx="1">
-            <a:schemeClr val="accent1"/>
-          </a:lnRef>
-          <a:fillRef idx="3">
-            <a:schemeClr val="accent1"/>
-          </a:fillRef>
-          <a:effectRef idx="2">
-            <a:schemeClr val="accent1"/>
-          </a:effectRef>
-          <a:fontRef idx="minor">
-            <a:schemeClr val="lt1"/>
-          </a:fontRef>
-        </p:style>
+        <p:spPr/>
         <p:txBody>
           <a:bodyPr/>
           <a:lstStyle/>
           <a:p>
-            <a:endParaRPr lang="en-US"/>
-          </a:p>
-        </p:txBody>
-      </p:sp>
-      <p:sp>
-        <p:nvSpPr>
-          <p:cNvPr id="25" name="Rectangle 24">
-            <a:extLst>
-              <a:ext uri="{FF2B5EF4-FFF2-40B4-BE49-F238E27FC236}">
-                <a16:creationId xmlns:a16="http://schemas.microsoft.com/office/drawing/2014/main" id="{A310A41F-3A14-4150-B6CF-0A577DDDEAD2}"/>
-              </a:ext>
-              <a:ext uri="{C183D7F6-B498-43B3-948B-1728B52AA6E4}">
-                <adec:decorative xmlns:adec="http://schemas.microsoft.com/office/drawing/2017/decorative" val="1"/>
-              </a:ext>
-            </a:extLst>
-          </p:cNvPr>
-          <p:cNvSpPr>
-            <a:spLocks noGrp="1" noRot="1" noChangeAspect="1" noMove="1" noResize="1" noEditPoints="1" noAdjustHandles="1" noChangeArrowheads="1" noChangeShapeType="1" noTextEdit="1"/>
-          </p:cNvSpPr>
-          <p:nvPr>
-            <p:extLst>
-              <p:ext uri="{386F3935-93C4-4BCD-93E2-E3B085C9AB24}">
-                <p16:designElem xmlns:p16="http://schemas.microsoft.com/office/powerpoint/2015/main" val="1"/>
-              </p:ext>
-            </p:extLst>
-          </p:nvPr>
-        </p:nvSpPr>
-        <p:spPr>
-          <a:xfrm>
-            <a:off x="8042147" y="453643"/>
-            <a:ext cx="3703320" cy="98554"/>
-          </a:xfrm>
-          <a:prstGeom prst="rect">
-            <a:avLst/>
-          </a:prstGeom>
-          <a:solidFill>
-            <a:srgbClr val="969FA7"/>
-          </a:solidFill>
-          <a:ln>
-            <a:noFill/>
-          </a:ln>
-          <a:effectLst/>
-        </p:spPr>
-        <p:style>
-          <a:lnRef idx="1">
-            <a:schemeClr val="accent1"/>
-          </a:lnRef>
-          <a:fillRef idx="3">
-            <a:schemeClr val="accent1"/>
-          </a:fillRef>
-          <a:effectRef idx="2">
-            <a:schemeClr val="accent1"/>
-          </a:effectRef>
-          <a:fontRef idx="minor">
-            <a:schemeClr val="lt1"/>
-          </a:fontRef>
-        </p:style>
-        <p:txBody>
-          <a:bodyPr/>
-          <a:lstStyle/>
-          <a:p>
-            <a:endParaRPr lang="en-US"/>
-          </a:p>
-        </p:txBody>
-      </p:sp>
-      <p:sp>
-        <p:nvSpPr>
-          <p:cNvPr id="27" name="Rectangle 26">
-            <a:extLst>
-              <a:ext uri="{FF2B5EF4-FFF2-40B4-BE49-F238E27FC236}">
-                <a16:creationId xmlns:a16="http://schemas.microsoft.com/office/drawing/2014/main" id="{7B89EEFD-93BC-4ACF-962C-E6279E72B00B}"/>
-              </a:ext>
-              <a:ext uri="{C183D7F6-B498-43B3-948B-1728B52AA6E4}">
-                <adec:decorative xmlns:adec="http://schemas.microsoft.com/office/drawing/2017/decorative" val="1"/>
-              </a:ext>
-            </a:extLst>
-          </p:cNvPr>
-          <p:cNvSpPr>
-            <a:spLocks noGrp="1" noRot="1" noChangeAspect="1" noMove="1" noResize="1" noEditPoints="1" noAdjustHandles="1" noChangeArrowheads="1" noChangeShapeType="1" noTextEdit="1"/>
-          </p:cNvSpPr>
-          <p:nvPr>
-            <p:extLst>
-              <p:ext uri="{386F3935-93C4-4BCD-93E2-E3B085C9AB24}">
-                <p16:designElem xmlns:p16="http://schemas.microsoft.com/office/powerpoint/2015/main" val="1"/>
-              </p:ext>
-            </p:extLst>
-          </p:nvPr>
-        </p:nvSpPr>
-        <p:spPr>
-          <a:xfrm>
-            <a:off x="461436" y="723899"/>
-            <a:ext cx="3703320" cy="5666666"/>
-          </a:xfrm>
-          <a:prstGeom prst="rect">
-            <a:avLst/>
-          </a:prstGeom>
-          <a:solidFill>
-            <a:srgbClr val="465359"/>
-          </a:solidFill>
-          <a:ln>
-            <a:noFill/>
-          </a:ln>
-          <a:effectLst/>
-        </p:spPr>
-        <p:style>
-          <a:lnRef idx="1">
-            <a:schemeClr val="accent1"/>
-          </a:lnRef>
-          <a:fillRef idx="3">
-            <a:schemeClr val="accent1"/>
-          </a:fillRef>
-          <a:effectRef idx="2">
-            <a:schemeClr val="accent1"/>
-          </a:effectRef>
-          <a:fontRef idx="minor">
-            <a:schemeClr val="lt1"/>
-          </a:fontRef>
-        </p:style>
-        <p:txBody>
-          <a:bodyPr/>
-          <a:lstStyle/>
-          <a:p>
-            <a:endParaRPr lang="en-US"/>
-          </a:p>
-        </p:txBody>
-      </p:sp>
-      <p:sp>
-        <p:nvSpPr>
-          <p:cNvPr id="7" name="Title 3">
-            <a:extLst>
-              <a:ext uri="{FF2B5EF4-FFF2-40B4-BE49-F238E27FC236}">
-                <a16:creationId xmlns:a16="http://schemas.microsoft.com/office/drawing/2014/main" id="{AA9E537E-8F1D-CE1E-C433-D916E2A818CB}"/>
-              </a:ext>
-            </a:extLst>
-          </p:cNvPr>
-          <p:cNvSpPr txBox="1">
-            <a:spLocks/>
-          </p:cNvSpPr>
-          <p:nvPr/>
-        </p:nvSpPr>
-        <p:spPr>
-          <a:xfrm>
-            <a:off x="803189" y="1209184"/>
-            <a:ext cx="3089189" cy="4734416"/>
-          </a:xfrm>
-          <a:prstGeom prst="rect">
-            <a:avLst/>
-          </a:prstGeom>
-        </p:spPr>
-        <p:txBody>
-          <a:bodyPr vert="horz" lIns="91440" tIns="45720" rIns="91440" bIns="45720" rtlCol="0" anchor="ctr" anchorCtr="0">
-            <a:normAutofit/>
-          </a:bodyPr>
-          <a:lstStyle>
-            <a:lvl1pPr algn="l" defTabSz="457200" rtl="0" eaLnBrk="1" latinLnBrk="0" hangingPunct="1">
-              <a:lnSpc>
-                <a:spcPct val="100000"/>
-              </a:lnSpc>
-              <a:spcBef>
-                <a:spcPct val="0"/>
-              </a:spcBef>
-              <a:buNone/>
-              <a:defRPr sz="2800" b="0" kern="1200" cap="all">
-                <a:solidFill>
-                  <a:schemeClr val="tx1">
-                    <a:lumMod val="75000"/>
-                    <a:lumOff val="25000"/>
-                  </a:schemeClr>
-                </a:solidFill>
-                <a:latin typeface="+mj-lt"/>
-                <a:ea typeface="+mj-ea"/>
-                <a:cs typeface="+mj-cs"/>
-              </a:defRPr>
-            </a:lvl1pPr>
-            <a:lvl2pPr eaLnBrk="1" hangingPunct="1">
-              <a:defRPr>
-                <a:solidFill>
-                  <a:schemeClr val="tx2"/>
-                </a:solidFill>
-              </a:defRPr>
-            </a:lvl2pPr>
-            <a:lvl3pPr eaLnBrk="1" hangingPunct="1">
-              <a:defRPr>
-                <a:solidFill>
-                  <a:schemeClr val="tx2"/>
-                </a:solidFill>
-              </a:defRPr>
-            </a:lvl3pPr>
-            <a:lvl4pPr eaLnBrk="1" hangingPunct="1">
-              <a:defRPr>
-                <a:solidFill>
-                  <a:schemeClr val="tx2"/>
-                </a:solidFill>
-              </a:defRPr>
-            </a:lvl4pPr>
-            <a:lvl5pPr eaLnBrk="1" hangingPunct="1">
-              <a:defRPr>
-                <a:solidFill>
-                  <a:schemeClr val="tx2"/>
-                </a:solidFill>
-              </a:defRPr>
-            </a:lvl5pPr>
-            <a:lvl6pPr eaLnBrk="1" hangingPunct="1">
-              <a:defRPr>
-                <a:solidFill>
-                  <a:schemeClr val="tx2"/>
-                </a:solidFill>
-              </a:defRPr>
-            </a:lvl6pPr>
-            <a:lvl7pPr eaLnBrk="1" hangingPunct="1">
-              <a:defRPr>
-                <a:solidFill>
-                  <a:schemeClr val="tx2"/>
-                </a:solidFill>
-              </a:defRPr>
-            </a:lvl7pPr>
-            <a:lvl8pPr eaLnBrk="1" hangingPunct="1">
-              <a:defRPr>
-                <a:solidFill>
-                  <a:schemeClr val="tx2"/>
-                </a:solidFill>
-              </a:defRPr>
-            </a:lvl8pPr>
-            <a:lvl9pPr eaLnBrk="1" hangingPunct="1">
-              <a:defRPr>
-                <a:solidFill>
-                  <a:schemeClr val="tx2"/>
-                </a:solidFill>
-              </a:defRPr>
-            </a:lvl9pPr>
-          </a:lstStyle>
-          <a:p>
-            <a:pPr>
-              <a:spcAft>
-                <a:spcPts val="600"/>
-              </a:spcAft>
-            </a:pPr>
-            <a:r>
-              <a:rPr lang="en-US">
-                <a:solidFill>
-                  <a:srgbClr val="FFFFFF"/>
-                </a:solidFill>
-              </a:rPr>
-              <a:t>results</a:t>
-            </a:r>
-          </a:p>
-        </p:txBody>
-      </p:sp>
-      <p:sp>
-        <p:nvSpPr>
-          <p:cNvPr id="6" name="TextBox 5">
-            <a:extLst>
-              <a:ext uri="{FF2B5EF4-FFF2-40B4-BE49-F238E27FC236}">
-                <a16:creationId xmlns:a16="http://schemas.microsoft.com/office/drawing/2014/main" id="{A57CE0FA-5284-2C21-392D-79C5D5E7A8AE}"/>
-              </a:ext>
-            </a:extLst>
-          </p:cNvPr>
-          <p:cNvSpPr txBox="1"/>
-          <p:nvPr/>
-        </p:nvSpPr>
-        <p:spPr>
-          <a:xfrm>
-            <a:off x="4561870" y="723900"/>
-            <a:ext cx="7183597" cy="3152362"/>
-          </a:xfrm>
-          <a:prstGeom prst="rect">
-            <a:avLst/>
-          </a:prstGeom>
-        </p:spPr>
-        <p:txBody>
-          <a:bodyPr vert="horz" lIns="91440" tIns="45720" rIns="91440" bIns="45720" rtlCol="0" anchor="ctr">
-            <a:normAutofit/>
-          </a:bodyPr>
-          <a:lstStyle/>
-          <a:p>
-            <a:pPr defTabSz="457200">
-              <a:spcBef>
-                <a:spcPct val="20000"/>
-              </a:spcBef>
-              <a:spcAft>
-                <a:spcPts val="600"/>
-              </a:spcAft>
-              <a:buClr>
-                <a:schemeClr val="accent1"/>
-              </a:buClr>
-              <a:buSzPct val="92000"/>
-              <a:buFont typeface="Wingdings 2" panose="05020102010507070707" pitchFamily="18" charset="2"/>
-              <a:buChar char=""/>
-            </a:pPr>
-            <a:r>
-              <a:rPr lang="en-US" b="0" i="0">
-                <a:solidFill>
-                  <a:schemeClr val="tx1">
-                    <a:lumMod val="75000"/>
-                    <a:lumOff val="25000"/>
-                  </a:schemeClr>
-                </a:solidFill>
-                <a:effectLst/>
-              </a:rPr>
-              <a:t>We can observe that the accuracy rate is between 50% - 70%. It is desired that high accuracy should on the sequence is required in an anomaly detection program. Due to hardware specification of our machine, we unable to run the program with lots of cycle and sequence. However, accuracy can be improved by running more data sequence and cycle.</a:t>
-            </a:r>
-          </a:p>
-          <a:p>
-            <a:pPr defTabSz="457200">
-              <a:spcBef>
-                <a:spcPct val="20000"/>
-              </a:spcBef>
-              <a:spcAft>
-                <a:spcPts val="600"/>
-              </a:spcAft>
-              <a:buClr>
-                <a:schemeClr val="accent1"/>
-              </a:buClr>
-              <a:buSzPct val="92000"/>
-              <a:buFont typeface="Wingdings 2" panose="05020102010507070707" pitchFamily="18" charset="2"/>
-              <a:buChar char=""/>
-            </a:pPr>
-            <a:r>
-              <a:rPr lang="en-US" b="0" i="0">
-                <a:solidFill>
-                  <a:schemeClr val="tx1">
-                    <a:lumMod val="75000"/>
-                    <a:lumOff val="25000"/>
-                  </a:schemeClr>
-                </a:solidFill>
-                <a:effectLst/>
-              </a:rPr>
-              <a:t>One example of testing sequence for anomaly detection and average accuracy for this sequence given below:</a:t>
-            </a:r>
-          </a:p>
-          <a:p>
-            <a:pPr defTabSz="457200">
-              <a:spcBef>
-                <a:spcPct val="20000"/>
-              </a:spcBef>
-              <a:spcAft>
-                <a:spcPts val="600"/>
-              </a:spcAft>
-              <a:buClr>
-                <a:schemeClr val="accent1"/>
-              </a:buClr>
-              <a:buSzPct val="92000"/>
-              <a:buFont typeface="Wingdings 2" panose="05020102010507070707" pitchFamily="18" charset="2"/>
-              <a:buChar char=""/>
-            </a:pPr>
-            <a:endParaRPr lang="en-US">
-              <a:solidFill>
-                <a:schemeClr val="tx1">
-                  <a:lumMod val="75000"/>
-                  <a:lumOff val="25000"/>
-                </a:schemeClr>
-              </a:solidFill>
-            </a:endParaRPr>
+            <a:fld id="{3A98EE3D-8CD1-4C3F-BD1C-C98C9596463C}" type="slidenum">
+              <a:rPr lang="en-US" smtClean="0"/>
+              <a:t>9</a:t>
+            </a:fld>
+            <a:endParaRPr lang="en-US" dirty="0"/>
           </a:p>
         </p:txBody>
       </p:sp>
       <p:pic>
         <p:nvPicPr>
-          <p:cNvPr id="4" name="Picture 3">
+          <p:cNvPr id="7" name="Picture 6">
             <a:extLst>
               <a:ext uri="{FF2B5EF4-FFF2-40B4-BE49-F238E27FC236}">
-                <a16:creationId xmlns:a16="http://schemas.microsoft.com/office/drawing/2014/main" id="{2665CE9A-DE25-BC57-3FA2-06E32EE9D3FF}"/>
+                <a16:creationId xmlns:a16="http://schemas.microsoft.com/office/drawing/2014/main" id="{667A415B-592E-E291-3ED2-A0EF405615FE}"/>
               </a:ext>
             </a:extLst>
           </p:cNvPr>
@@ -17866,72 +19613,48 @@
         </p:blipFill>
         <p:spPr>
           <a:xfrm>
-            <a:off x="4771381" y="3501743"/>
-            <a:ext cx="6974086" cy="2196838"/>
+            <a:off x="674975" y="2488963"/>
+            <a:ext cx="5115639" cy="1181265"/>
           </a:xfrm>
           <a:prstGeom prst="rect">
             <a:avLst/>
           </a:prstGeom>
         </p:spPr>
       </p:pic>
-      <p:sp>
-        <p:nvSpPr>
-          <p:cNvPr id="5" name="Slide Number Placeholder 4">
+      <p:pic>
+        <p:nvPicPr>
+          <p:cNvPr id="9" name="Picture 8">
             <a:extLst>
               <a:ext uri="{FF2B5EF4-FFF2-40B4-BE49-F238E27FC236}">
-                <a16:creationId xmlns:a16="http://schemas.microsoft.com/office/drawing/2014/main" id="{2687D6E6-D5FA-4C9E-C76D-CC433D92DBC4}"/>
+                <a16:creationId xmlns:a16="http://schemas.microsoft.com/office/drawing/2014/main" id="{76784176-A071-91E1-C405-67C6D8AF4734}"/>
               </a:ext>
             </a:extLst>
           </p:cNvPr>
-          <p:cNvSpPr>
-            <a:spLocks noGrp="1"/>
-          </p:cNvSpPr>
-          <p:nvPr>
-            <p:ph type="sldNum" sz="quarter" idx="12"/>
-          </p:nvPr>
-        </p:nvSpPr>
+          <p:cNvPicPr>
+            <a:picLocks noChangeAspect="1"/>
+          </p:cNvPicPr>
+          <p:nvPr/>
+        </p:nvPicPr>
+        <p:blipFill>
+          <a:blip r:embed="rId3"/>
+          <a:stretch>
+            <a:fillRect/>
+          </a:stretch>
+        </p:blipFill>
         <p:spPr>
           <a:xfrm>
-            <a:off x="10558300" y="6400800"/>
-            <a:ext cx="1052508" cy="365125"/>
+            <a:off x="674975" y="4779453"/>
+            <a:ext cx="4591691" cy="933580"/>
           </a:xfrm>
+          <a:prstGeom prst="rect">
+            <a:avLst/>
+          </a:prstGeom>
         </p:spPr>
-        <p:txBody>
-          <a:bodyPr vert="horz" lIns="91440" tIns="45720" rIns="91440" bIns="45720" rtlCol="0" anchor="ctr">
-            <a:normAutofit/>
-          </a:bodyPr>
-          <a:lstStyle/>
-          <a:p>
-            <a:pPr defTabSz="457200">
-              <a:spcAft>
-                <a:spcPts val="600"/>
-              </a:spcAft>
-            </a:pPr>
-            <a:fld id="{3A98EE3D-8CD1-4C3F-BD1C-C98C9596463C}" type="slidenum">
-              <a:rPr lang="en-US" smtClean="0">
-                <a:solidFill>
-                  <a:srgbClr val="F2BB6F"/>
-                </a:solidFill>
-              </a:rPr>
-              <a:pPr defTabSz="457200">
-                <a:spcAft>
-                  <a:spcPts val="600"/>
-                </a:spcAft>
-              </a:pPr>
-              <a:t>9</a:t>
-            </a:fld>
-            <a:endParaRPr lang="en-US">
-              <a:solidFill>
-                <a:srgbClr val="F2BB6F"/>
-              </a:solidFill>
-            </a:endParaRPr>
-          </a:p>
-        </p:txBody>
-      </p:sp>
+      </p:pic>
     </p:spTree>
     <p:extLst>
       <p:ext uri="{BB962C8B-B14F-4D97-AF65-F5344CB8AC3E}">
-        <p14:creationId xmlns:p14="http://schemas.microsoft.com/office/powerpoint/2010/main" val="3566107136"/>
+        <p14:creationId xmlns:p14="http://schemas.microsoft.com/office/powerpoint/2010/main" val="2668324980"/>
       </p:ext>
     </p:extLst>
   </p:cSld>

</xml_diff>

<commit_message>
Team presentation updated with minor changes
</commit_message>
<xml_diff>
--- a/source/MySEProject/Documentation/ML2324-8 Implement Anomaly Detection Sample.pptx
+++ b/source/MySEProject/Documentation/ML2324-8 Implement Anomaly Detection Sample.pptx
@@ -6600,7 +6600,7 @@
           <a:p>
             <a:fld id="{FE8148D4-9014-475C-AC97-8AF4C70FC226}" type="datetimeFigureOut">
               <a:rPr lang="de-DE" smtClean="0"/>
-              <a:t>30.03.2024</a:t>
+              <a:t>31.03.2024</a:t>
             </a:fld>
             <a:endParaRPr lang="de-DE"/>
           </a:p>
@@ -7106,7 +7106,7 @@
           <a:p>
             <a:fld id="{DE12E154-F8FB-4181-8C6E-946582017057}" type="datetime1">
               <a:rPr lang="en-US" smtClean="0"/>
-              <a:t>3/30/2024</a:t>
+              <a:t>3/31/2024</a:t>
             </a:fld>
             <a:endParaRPr lang="en-US" dirty="0"/>
           </a:p>
@@ -7313,7 +7313,7 @@
           <a:p>
             <a:fld id="{D3F6D1A9-48E2-405B-ABFE-133730FF333B}" type="datetime1">
               <a:rPr lang="en-US" smtClean="0"/>
-              <a:t>3/30/2024</a:t>
+              <a:t>3/31/2024</a:t>
             </a:fld>
             <a:endParaRPr lang="en-US" dirty="0"/>
           </a:p>
@@ -7679,7 +7679,7 @@
           <a:p>
             <a:fld id="{80E4B351-D277-4D9E-BEB8-E1442F7FAC92}" type="datetime1">
               <a:rPr lang="en-US" smtClean="0"/>
-              <a:t>3/30/2024</a:t>
+              <a:t>3/31/2024</a:t>
             </a:fld>
             <a:endParaRPr lang="en-US" dirty="0"/>
           </a:p>
@@ -7881,7 +7881,7 @@
           <a:p>
             <a:fld id="{09843FE9-4D06-4A41-BEF1-B24D90A9F9ED}" type="datetime1">
               <a:rPr lang="en-US" smtClean="0"/>
-              <a:t>3/30/2024</a:t>
+              <a:t>3/31/2024</a:t>
             </a:fld>
             <a:endParaRPr lang="en-US" dirty="0"/>
           </a:p>
@@ -8197,7 +8197,7 @@
           <a:p>
             <a:fld id="{674DCBAD-E9EB-4B79-94E3-0DAEA08F2165}" type="datetime1">
               <a:rPr lang="en-US" smtClean="0"/>
-              <a:t>3/30/2024</a:t>
+              <a:t>3/31/2024</a:t>
             </a:fld>
             <a:endParaRPr lang="en-US" dirty="0"/>
           </a:p>
@@ -8454,7 +8454,7 @@
           <a:p>
             <a:fld id="{F86F6435-BC5A-4D63-8431-2354F4A14938}" type="datetime1">
               <a:rPr lang="en-US" smtClean="0"/>
-              <a:t>3/30/2024</a:t>
+              <a:t>3/31/2024</a:t>
             </a:fld>
             <a:endParaRPr lang="en-US" dirty="0"/>
           </a:p>
@@ -8880,7 +8880,7 @@
           <a:p>
             <a:fld id="{1502C01B-FDDF-4844-A5D4-9CE70E85D3C3}" type="datetime1">
               <a:rPr lang="en-US" smtClean="0"/>
-              <a:t>3/30/2024</a:t>
+              <a:t>3/31/2024</a:t>
             </a:fld>
             <a:endParaRPr lang="en-US" dirty="0"/>
           </a:p>
@@ -9007,7 +9007,7 @@
           <a:p>
             <a:fld id="{47687636-C395-40B2-BA12-D49A21CA7429}" type="datetime1">
               <a:rPr lang="en-US" smtClean="0"/>
-              <a:t>3/30/2024</a:t>
+              <a:t>3/31/2024</a:t>
             </a:fld>
             <a:endParaRPr lang="en-US" dirty="0"/>
           </a:p>
@@ -9106,7 +9106,7 @@
           <a:p>
             <a:fld id="{BC337A2E-82AF-4785-A280-7EC9AC00E7CF}" type="datetime1">
               <a:rPr lang="en-US" smtClean="0"/>
-              <a:t>3/30/2024</a:t>
+              <a:t>3/31/2024</a:t>
             </a:fld>
             <a:endParaRPr lang="en-US" dirty="0"/>
           </a:p>
@@ -9487,7 +9487,7 @@
           <a:p>
             <a:fld id="{9544AF48-6368-4AEB-BA61-86C35A0670BC}" type="datetime1">
               <a:rPr lang="en-US" smtClean="0"/>
-              <a:t>3/30/2024</a:t>
+              <a:t>3/31/2024</a:t>
             </a:fld>
             <a:endParaRPr lang="en-US" dirty="0"/>
           </a:p>
@@ -9784,7 +9784,7 @@
           <a:p>
             <a:fld id="{6A0AD317-F3FB-496C-99A4-43A2E3D62B38}" type="datetime1">
               <a:rPr lang="en-US" smtClean="0"/>
-              <a:t>3/30/2024</a:t>
+              <a:t>3/31/2024</a:t>
             </a:fld>
             <a:endParaRPr lang="en-US" dirty="0"/>
           </a:p>
@@ -10003,7 +10003,7 @@
           <a:p>
             <a:fld id="{F43DAC16-7D30-46B5-81CA-4A6DF4F80339}" type="datetime1">
               <a:rPr lang="en-US" smtClean="0"/>
-              <a:t>3/30/2024</a:t>
+              <a:t>3/31/2024</a:t>
             </a:fld>
             <a:endParaRPr lang="en-US" dirty="0"/>
           </a:p>
@@ -12377,34 +12377,24 @@
               <a:t>HTMAnomalyExperiment</a:t>
             </a:r>
             <a:r>
-              <a:rPr lang="en-US" b="0" i="0" dirty="0" err="1">
+              <a:rPr lang="en-US" b="0" i="0" dirty="0">
                 <a:solidFill>
                   <a:srgbClr val="1F2328"/>
                 </a:solidFill>
                 <a:effectLst/>
                 <a:latin typeface="-apple-system"/>
               </a:rPr>
-              <a:t>to</a:t>
-            </a:r>
-            <a:r>
-              <a:rPr lang="en-US" b="0" i="0" dirty="0">
+              <a:t> to detected anomalies in sequences read from files inside predicting folder. All the classes explained earlier- CSV files reading (</a:t>
+            </a:r>
+            <a:r>
+              <a:rPr lang="en-US" b="0" i="0" dirty="0" err="1">
                 <a:solidFill>
                   <a:srgbClr val="1F2328"/>
                 </a:solidFill>
                 <a:effectLst/>
                 <a:latin typeface="-apple-system"/>
               </a:rPr>
-              <a:t> detected anomalies in sequences read from files inside predicting folder. All the classes explained earlier- CSV files reading (</a:t>
-            </a:r>
-            <a:r>
-              <a:rPr lang="en-US" b="0" i="0" dirty="0" err="1">
-                <a:solidFill>
-                  <a:srgbClr val="1F2328"/>
-                </a:solidFill>
-                <a:effectLst/>
-                <a:latin typeface="-apple-system"/>
-              </a:rPr>
-              <a:t>CSVFileReader</a:t>
+              <a:t>CsvSequenceFolder</a:t>
             </a:r>
             <a:r>
               <a:rPr lang="en-US" b="0" i="0" dirty="0">
@@ -12424,7 +12414,7 @@
                 <a:effectLst/>
                 <a:latin typeface="-apple-system"/>
               </a:rPr>
-              <a:t>CSVToHTMInput</a:t>
+              <a:t>CSVToHTMInputConverter</a:t>
             </a:r>
             <a:r>
               <a:rPr lang="en-US" b="0" i="0" dirty="0">
@@ -12444,7 +12434,7 @@
                 <a:effectLst/>
                 <a:latin typeface="-apple-system"/>
               </a:rPr>
-              <a:t>HTMModelTraining</a:t>
+              <a:t>HTMTrainingManager</a:t>
             </a:r>
             <a:r>
               <a:rPr lang="en-US" b="0" i="0" dirty="0">
@@ -12526,7 +12516,7 @@
                 <a:effectLst/>
                 <a:latin typeface="-apple-system"/>
               </a:rPr>
-              <a:t>Path to training and predicting folder is set as default and passed on the constructor, or can be set inside the class manually.</a:t>
+              <a:t>Path to training and predicting folder is set as default and passed on the constructor,  or can be set inside the class manually.</a:t>
             </a:r>
             <a:endParaRPr lang="en-US" dirty="0"/>
           </a:p>

</xml_diff>